<commit_message>
Updates to Xamarin slides
</commit_message>
<xml_diff>
--- a/Intro to Xamarin F#/F#-iOS.pptx
+++ b/Intro to Xamarin F#/F#-iOS.pptx
@@ -5,10 +5,10 @@
     <p:sldMasterId id="2147483660" r:id="rId1"/>
   </p:sldMasterIdLst>
   <p:notesMasterIdLst>
-    <p:notesMasterId r:id="rId19"/>
+    <p:notesMasterId r:id="rId20"/>
   </p:notesMasterIdLst>
   <p:handoutMasterIdLst>
-    <p:handoutMasterId r:id="rId20"/>
+    <p:handoutMasterId r:id="rId21"/>
   </p:handoutMasterIdLst>
   <p:sldIdLst>
     <p:sldId id="256" r:id="rId2"/>
@@ -17,17 +17,18 @@
     <p:sldId id="272" r:id="rId5"/>
     <p:sldId id="263" r:id="rId6"/>
     <p:sldId id="280" r:id="rId7"/>
-    <p:sldId id="283" r:id="rId8"/>
-    <p:sldId id="278" r:id="rId9"/>
-    <p:sldId id="265" r:id="rId10"/>
-    <p:sldId id="266" r:id="rId11"/>
-    <p:sldId id="267" r:id="rId12"/>
-    <p:sldId id="260" r:id="rId13"/>
-    <p:sldId id="279" r:id="rId14"/>
-    <p:sldId id="270" r:id="rId15"/>
-    <p:sldId id="284" r:id="rId16"/>
-    <p:sldId id="271" r:id="rId17"/>
-    <p:sldId id="282" r:id="rId18"/>
+    <p:sldId id="285" r:id="rId8"/>
+    <p:sldId id="283" r:id="rId9"/>
+    <p:sldId id="278" r:id="rId10"/>
+    <p:sldId id="265" r:id="rId11"/>
+    <p:sldId id="266" r:id="rId12"/>
+    <p:sldId id="267" r:id="rId13"/>
+    <p:sldId id="260" r:id="rId14"/>
+    <p:sldId id="279" r:id="rId15"/>
+    <p:sldId id="270" r:id="rId16"/>
+    <p:sldId id="284" r:id="rId17"/>
+    <p:sldId id="271" r:id="rId18"/>
+    <p:sldId id="282" r:id="rId19"/>
   </p:sldIdLst>
   <p:sldSz cx="9144000" cy="5715000" type="screen16x10"/>
   <p:notesSz cx="6858000" cy="9144000"/>
@@ -145,6 +146,7 @@
         <p14:section name="F# Fundamentals" id="{FF51CFEC-3D65-4AF3-8D54-F9942CBED344}">
           <p14:sldIdLst>
             <p14:sldId id="280"/>
+            <p14:sldId id="285"/>
             <p14:sldId id="283"/>
           </p14:sldIdLst>
         </p14:section>
@@ -2924,16 +2926,16 @@
     </dgm:pt>
   </dgm:ptLst>
   <dgm:cxnLst>
+    <dgm:cxn modelId="{6F1EB540-E933-4FFE-AD59-902F82EAC555}" type="presOf" srcId="{4EFECE58-A886-4586-8929-351B92A3FCAC}" destId="{AFD76EB0-A822-42DF-B215-58F3D5068DD3}" srcOrd="0" destOrd="0" presId="urn:microsoft.com/office/officeart/2008/layout/VerticalCurvedList"/>
+    <dgm:cxn modelId="{146B53AD-9D19-4058-BCD8-1C249FFC2F69}" srcId="{4583716A-56B4-4D3B-B07C-1ED04DBF9780}" destId="{FF9F151C-D916-4F36-BAB4-571F1A65D64C}" srcOrd="1" destOrd="0" parTransId="{3C2D1B8B-12EB-40C5-B29F-B2695B7C0BC5}" sibTransId="{D2EE688C-2ECE-485C-A1AB-10F7B86D98AD}"/>
+    <dgm:cxn modelId="{5CF4CA5A-379B-4397-891E-14104252B005}" type="presOf" srcId="{D5168158-2390-4A3E-979D-F6CFB2AD1652}" destId="{4B433EF5-E09C-4E89-AC54-57AF32427E34}" srcOrd="0" destOrd="0" presId="urn:microsoft.com/office/officeart/2008/layout/VerticalCurvedList"/>
+    <dgm:cxn modelId="{B1F7811B-069F-47DC-88F6-7E26BE3BDE64}" type="presOf" srcId="{4583716A-56B4-4D3B-B07C-1ED04DBF9780}" destId="{9F074360-7A38-4249-87F0-AA9D0F81D664}" srcOrd="0" destOrd="0" presId="urn:microsoft.com/office/officeart/2008/layout/VerticalCurvedList"/>
+    <dgm:cxn modelId="{D47FE6EC-2DAD-44E0-8350-6863A07F4D21}" srcId="{4583716A-56B4-4D3B-B07C-1ED04DBF9780}" destId="{4EFECE58-A886-4586-8929-351B92A3FCAC}" srcOrd="2" destOrd="0" parTransId="{12867411-2EF5-42B1-99B3-C40F57D0F023}" sibTransId="{F226A3D1-7C2B-4EBA-AD84-BCB518A3DC31}"/>
+    <dgm:cxn modelId="{5B2AD088-F882-48D4-B99C-3D118F7DCB03}" type="presOf" srcId="{FF9F151C-D916-4F36-BAB4-571F1A65D64C}" destId="{25BE9474-0D72-488B-9DF7-0703C9164E8C}" srcOrd="0" destOrd="0" presId="urn:microsoft.com/office/officeart/2008/layout/VerticalCurvedList"/>
+    <dgm:cxn modelId="{AE3FCC84-7024-4E39-9D17-3D0D7930A9EC}" type="presOf" srcId="{F86FB727-4A7D-4084-A027-067C6C7C8EF1}" destId="{77DC87CD-E2BE-4308-89B2-4347F0D9C791}" srcOrd="0" destOrd="0" presId="urn:microsoft.com/office/officeart/2008/layout/VerticalCurvedList"/>
+    <dgm:cxn modelId="{7B0C96B8-218C-4EF2-845E-EC969026BC8C}" srcId="{4583716A-56B4-4D3B-B07C-1ED04DBF9780}" destId="{DF391389-8BAD-4E90-83A1-7335364AD7F6}" srcOrd="0" destOrd="0" parTransId="{E0CE007A-EC90-4863-8612-6550BA1A75D7}" sibTransId="{F86FB727-4A7D-4084-A027-067C6C7C8EF1}"/>
     <dgm:cxn modelId="{3C63E4D0-39BA-450E-B10B-76C7C9C65993}" type="presOf" srcId="{DF391389-8BAD-4E90-83A1-7335364AD7F6}" destId="{D626B2F3-E94A-4442-9D52-A33CBA4DC6FB}" srcOrd="0" destOrd="0" presId="urn:microsoft.com/office/officeart/2008/layout/VerticalCurvedList"/>
     <dgm:cxn modelId="{EA730BD5-18E3-4760-A7B5-2742C95EEC01}" srcId="{4583716A-56B4-4D3B-B07C-1ED04DBF9780}" destId="{D5168158-2390-4A3E-979D-F6CFB2AD1652}" srcOrd="3" destOrd="0" parTransId="{4B91A79C-EECD-4904-92D5-AF82EF982E95}" sibTransId="{1DBFF770-7073-40FB-856C-A18B111AF8B4}"/>
-    <dgm:cxn modelId="{D47FE6EC-2DAD-44E0-8350-6863A07F4D21}" srcId="{4583716A-56B4-4D3B-B07C-1ED04DBF9780}" destId="{4EFECE58-A886-4586-8929-351B92A3FCAC}" srcOrd="2" destOrd="0" parTransId="{12867411-2EF5-42B1-99B3-C40F57D0F023}" sibTransId="{F226A3D1-7C2B-4EBA-AD84-BCB518A3DC31}"/>
-    <dgm:cxn modelId="{7B0C96B8-218C-4EF2-845E-EC969026BC8C}" srcId="{4583716A-56B4-4D3B-B07C-1ED04DBF9780}" destId="{DF391389-8BAD-4E90-83A1-7335364AD7F6}" srcOrd="0" destOrd="0" parTransId="{E0CE007A-EC90-4863-8612-6550BA1A75D7}" sibTransId="{F86FB727-4A7D-4084-A027-067C6C7C8EF1}"/>
-    <dgm:cxn modelId="{B1F7811B-069F-47DC-88F6-7E26BE3BDE64}" type="presOf" srcId="{4583716A-56B4-4D3B-B07C-1ED04DBF9780}" destId="{9F074360-7A38-4249-87F0-AA9D0F81D664}" srcOrd="0" destOrd="0" presId="urn:microsoft.com/office/officeart/2008/layout/VerticalCurvedList"/>
-    <dgm:cxn modelId="{6F1EB540-E933-4FFE-AD59-902F82EAC555}" type="presOf" srcId="{4EFECE58-A886-4586-8929-351B92A3FCAC}" destId="{AFD76EB0-A822-42DF-B215-58F3D5068DD3}" srcOrd="0" destOrd="0" presId="urn:microsoft.com/office/officeart/2008/layout/VerticalCurvedList"/>
-    <dgm:cxn modelId="{146B53AD-9D19-4058-BCD8-1C249FFC2F69}" srcId="{4583716A-56B4-4D3B-B07C-1ED04DBF9780}" destId="{FF9F151C-D916-4F36-BAB4-571F1A65D64C}" srcOrd="1" destOrd="0" parTransId="{3C2D1B8B-12EB-40C5-B29F-B2695B7C0BC5}" sibTransId="{D2EE688C-2ECE-485C-A1AB-10F7B86D98AD}"/>
-    <dgm:cxn modelId="{5B2AD088-F882-48D4-B99C-3D118F7DCB03}" type="presOf" srcId="{FF9F151C-D916-4F36-BAB4-571F1A65D64C}" destId="{25BE9474-0D72-488B-9DF7-0703C9164E8C}" srcOrd="0" destOrd="0" presId="urn:microsoft.com/office/officeart/2008/layout/VerticalCurvedList"/>
-    <dgm:cxn modelId="{AE3FCC84-7024-4E39-9D17-3D0D7930A9EC}" type="presOf" srcId="{F86FB727-4A7D-4084-A027-067C6C7C8EF1}" destId="{77DC87CD-E2BE-4308-89B2-4347F0D9C791}" srcOrd="0" destOrd="0" presId="urn:microsoft.com/office/officeart/2008/layout/VerticalCurvedList"/>
-    <dgm:cxn modelId="{5CF4CA5A-379B-4397-891E-14104252B005}" type="presOf" srcId="{D5168158-2390-4A3E-979D-F6CFB2AD1652}" destId="{4B433EF5-E09C-4E89-AC54-57AF32427E34}" srcOrd="0" destOrd="0" presId="urn:microsoft.com/office/officeart/2008/layout/VerticalCurvedList"/>
     <dgm:cxn modelId="{CE0CC47D-D438-4886-BE94-D3844BA7E00E}" type="presParOf" srcId="{9F074360-7A38-4249-87F0-AA9D0F81D664}" destId="{88774335-2119-488B-B850-885470039299}" srcOrd="0" destOrd="0" presId="urn:microsoft.com/office/officeart/2008/layout/VerticalCurvedList"/>
     <dgm:cxn modelId="{A4AC2E65-A228-4D93-9DB3-742BA4C40710}" type="presParOf" srcId="{88774335-2119-488B-B850-885470039299}" destId="{F4407F4B-5F8E-474A-BE95-27146A410928}" srcOrd="0" destOrd="0" presId="urn:microsoft.com/office/officeart/2008/layout/VerticalCurvedList"/>
     <dgm:cxn modelId="{74E07EC3-1A2B-42BC-AAE8-887A789E9AF8}" type="presParOf" srcId="{F4407F4B-5F8E-474A-BE95-27146A410928}" destId="{E68FFB02-7D37-44AE-8539-925642C08702}" srcOrd="0" destOrd="0" presId="urn:microsoft.com/office/officeart/2008/layout/VerticalCurvedList"/>
@@ -22294,7 +22296,7 @@
             </a:pPr>
             <a:r>
               <a:rPr lang="en-US" baseline="0" dirty="0" smtClean="0"/>
-              <a:t>Figured I’d start by covering why you should consider F# </a:t>
+              <a:t>Start w/ covering why you should consider F# </a:t>
             </a:r>
           </a:p>
           <a:p>
@@ -22348,6 +22350,108 @@
 </file>
 
 <file path=ppt/notesSlides/notesSlide10.xml><?xml version="1.0" encoding="utf-8"?>
+<p:notes xmlns:a="http://schemas.openxmlformats.org/drawingml/2006/main" xmlns:r="http://schemas.openxmlformats.org/officeDocument/2006/relationships" xmlns:p="http://schemas.openxmlformats.org/presentationml/2006/main">
+  <p:cSld>
+    <p:spTree>
+      <p:nvGrpSpPr>
+        <p:cNvPr id="1" name=""/>
+        <p:cNvGrpSpPr/>
+        <p:nvPr/>
+      </p:nvGrpSpPr>
+      <p:grpSpPr>
+        <a:xfrm>
+          <a:off x="0" y="0"/>
+          <a:ext cx="0" cy="0"/>
+          <a:chOff x="0" y="0"/>
+          <a:chExt cx="0" cy="0"/>
+        </a:xfrm>
+      </p:grpSpPr>
+      <p:sp>
+        <p:nvSpPr>
+          <p:cNvPr id="2" name="Slide Image Placeholder 1"/>
+          <p:cNvSpPr>
+            <a:spLocks noGrp="1" noRot="1" noChangeAspect="1"/>
+          </p:cNvSpPr>
+          <p:nvPr>
+            <p:ph type="sldImg"/>
+          </p:nvPr>
+        </p:nvSpPr>
+        <p:spPr/>
+      </p:sp>
+      <p:sp>
+        <p:nvSpPr>
+          <p:cNvPr id="3" name="Notes Placeholder 2"/>
+          <p:cNvSpPr>
+            <a:spLocks noGrp="1"/>
+          </p:cNvSpPr>
+          <p:nvPr>
+            <p:ph type="body" idx="1"/>
+          </p:nvPr>
+        </p:nvSpPr>
+        <p:spPr/>
+        <p:txBody>
+          <a:bodyPr/>
+          <a:lstStyle/>
+          <a:p>
+            <a:r>
+              <a:rPr lang="en-US" dirty="0" smtClean="0"/>
+              <a:t>Register each view controller.</a:t>
+            </a:r>
+            <a:r>
+              <a:rPr lang="en-US" baseline="0" dirty="0" smtClean="0"/>
+              <a:t> </a:t>
+            </a:r>
+          </a:p>
+          <a:p>
+            <a:endParaRPr lang="en-US" baseline="0" dirty="0" smtClean="0"/>
+          </a:p>
+          <a:p>
+            <a:r>
+              <a:rPr lang="en-US" baseline="0" dirty="0" smtClean="0"/>
+              <a:t>Override </a:t>
+            </a:r>
+            <a:r>
+              <a:rPr lang="en-US" baseline="0" dirty="0" err="1" smtClean="0"/>
+              <a:t>ViewDidLoad</a:t>
+            </a:r>
+            <a:r>
+              <a:rPr lang="en-US" baseline="0" dirty="0" smtClean="0"/>
+              <a:t>, </a:t>
+            </a:r>
+            <a:r>
+              <a:rPr lang="en-US" baseline="0" dirty="0" err="1" smtClean="0"/>
+              <a:t>ViewWillAppear</a:t>
+            </a:r>
+            <a:r>
+              <a:rPr lang="en-US" baseline="0" dirty="0" smtClean="0"/>
+              <a:t>, </a:t>
+            </a:r>
+            <a:r>
+              <a:rPr lang="en-US" baseline="0" dirty="0" err="1" smtClean="0"/>
+              <a:t>ViewDidAppear</a:t>
+            </a:r>
+            <a:r>
+              <a:rPr lang="en-US" baseline="0" dirty="0" smtClean="0"/>
+              <a:t>…</a:t>
+            </a:r>
+            <a:endParaRPr lang="en-US" dirty="0"/>
+          </a:p>
+        </p:txBody>
+      </p:sp>
+    </p:spTree>
+    <p:extLst>
+      <p:ext uri="{BB962C8B-B14F-4D97-AF65-F5344CB8AC3E}">
+        <p14:creationId xmlns:p14="http://schemas.microsoft.com/office/powerpoint/2010/main" val="1947247215"/>
+      </p:ext>
+    </p:extLst>
+  </p:cSld>
+  <p:clrMapOvr>
+    <a:masterClrMapping/>
+  </p:clrMapOvr>
+</p:notes>
+</file>
+
+<file path=ppt/notesSlides/notesSlide11.xml><?xml version="1.0" encoding="utf-8"?>
 <p:notes xmlns:a="http://schemas.openxmlformats.org/drawingml/2006/main" xmlns:r="http://schemas.openxmlformats.org/officeDocument/2006/relationships" xmlns:p="http://schemas.openxmlformats.org/presentationml/2006/main">
   <p:cSld>
     <p:spTree>
@@ -22519,7 +22623,7 @@
             </a:r>
             <a:r>
               <a:rPr lang="en-US" baseline="0" dirty="0" smtClean="0"/>
-              <a:t> gets a bad </a:t>
+              <a:t> gets flack for lack of UI support. </a:t>
             </a:r>
             <a:endParaRPr lang="en-US" dirty="0"/>
           </a:p>
@@ -22645,6 +22749,73 @@
           <a:p>
             <a:r>
               <a:rPr lang="en-US" dirty="0" smtClean="0"/>
+              <a:t>Option types! </a:t>
+            </a:r>
+          </a:p>
+          <a:p>
+            <a:endParaRPr lang="en-US" dirty="0"/>
+          </a:p>
+        </p:txBody>
+      </p:sp>
+    </p:spTree>
+    <p:extLst>
+      <p:ext uri="{BB962C8B-B14F-4D97-AF65-F5344CB8AC3E}">
+        <p14:creationId xmlns:p14="http://schemas.microsoft.com/office/powerpoint/2010/main" val="4003613221"/>
+      </p:ext>
+    </p:extLst>
+  </p:cSld>
+  <p:clrMapOvr>
+    <a:masterClrMapping/>
+  </p:clrMapOvr>
+</p:notes>
+</file>
+
+<file path=ppt/notesSlides/notesSlide6.xml><?xml version="1.0" encoding="utf-8"?>
+<p:notes xmlns:a="http://schemas.openxmlformats.org/drawingml/2006/main" xmlns:r="http://schemas.openxmlformats.org/officeDocument/2006/relationships" xmlns:p="http://schemas.openxmlformats.org/presentationml/2006/main">
+  <p:cSld>
+    <p:spTree>
+      <p:nvGrpSpPr>
+        <p:cNvPr id="1" name=""/>
+        <p:cNvGrpSpPr/>
+        <p:nvPr/>
+      </p:nvGrpSpPr>
+      <p:grpSpPr>
+        <a:xfrm>
+          <a:off x="0" y="0"/>
+          <a:ext cx="0" cy="0"/>
+          <a:chOff x="0" y="0"/>
+          <a:chExt cx="0" cy="0"/>
+        </a:xfrm>
+      </p:grpSpPr>
+      <p:sp>
+        <p:nvSpPr>
+          <p:cNvPr id="2" name="Slide Image Placeholder 1"/>
+          <p:cNvSpPr>
+            <a:spLocks noGrp="1" noRot="1" noChangeAspect="1"/>
+          </p:cNvSpPr>
+          <p:nvPr>
+            <p:ph type="sldImg"/>
+          </p:nvPr>
+        </p:nvSpPr>
+        <p:spPr/>
+      </p:sp>
+      <p:sp>
+        <p:nvSpPr>
+          <p:cNvPr id="3" name="Notes Placeholder 2"/>
+          <p:cNvSpPr>
+            <a:spLocks noGrp="1"/>
+          </p:cNvSpPr>
+          <p:nvPr>
+            <p:ph type="body" idx="1"/>
+          </p:nvPr>
+        </p:nvSpPr>
+        <p:spPr/>
+        <p:txBody>
+          <a:bodyPr/>
+          <a:lstStyle/>
+          <a:p>
+            <a:r>
+              <a:rPr lang="en-US" dirty="0" smtClean="0"/>
               <a:t>Similar</a:t>
             </a:r>
             <a:r>
@@ -22692,7 +22863,7 @@
 </p:notes>
 </file>
 
-<file path=ppt/notesSlides/notesSlide6.xml><?xml version="1.0" encoding="utf-8"?>
+<file path=ppt/notesSlides/notesSlide7.xml><?xml version="1.0" encoding="utf-8"?>
 <p:notes xmlns:a="http://schemas.openxmlformats.org/drawingml/2006/main" xmlns:r="http://schemas.openxmlformats.org/officeDocument/2006/relationships" xmlns:p="http://schemas.openxmlformats.org/presentationml/2006/main">
   <p:cSld>
     <p:spTree>
@@ -22753,7 +22924,7 @@
 </p:notes>
 </file>
 
-<file path=ppt/notesSlides/notesSlide7.xml><?xml version="1.0" encoding="utf-8"?>
+<file path=ppt/notesSlides/notesSlide8.xml><?xml version="1.0" encoding="utf-8"?>
 <p:notes xmlns:a="http://schemas.openxmlformats.org/drawingml/2006/main" xmlns:r="http://schemas.openxmlformats.org/officeDocument/2006/relationships" xmlns:p="http://schemas.openxmlformats.org/presentationml/2006/main">
   <p:cSld>
     <p:spTree>
@@ -22822,7 +22993,7 @@
 </p:notes>
 </file>
 
-<file path=ppt/notesSlides/notesSlide8.xml><?xml version="1.0" encoding="utf-8"?>
+<file path=ppt/notesSlides/notesSlide9.xml><?xml version="1.0" encoding="utf-8"?>
 <p:notes xmlns:a="http://schemas.openxmlformats.org/drawingml/2006/main" xmlns:r="http://schemas.openxmlformats.org/officeDocument/2006/relationships" xmlns:p="http://schemas.openxmlformats.org/presentationml/2006/main">
   <p:cSld>
     <p:spTree>
@@ -22911,108 +23082,6 @@
     <p:extLst>
       <p:ext uri="{BB962C8B-B14F-4D97-AF65-F5344CB8AC3E}">
         <p14:creationId xmlns:p14="http://schemas.microsoft.com/office/powerpoint/2010/main" val="1518105697"/>
-      </p:ext>
-    </p:extLst>
-  </p:cSld>
-  <p:clrMapOvr>
-    <a:masterClrMapping/>
-  </p:clrMapOvr>
-</p:notes>
-</file>
-
-<file path=ppt/notesSlides/notesSlide9.xml><?xml version="1.0" encoding="utf-8"?>
-<p:notes xmlns:a="http://schemas.openxmlformats.org/drawingml/2006/main" xmlns:r="http://schemas.openxmlformats.org/officeDocument/2006/relationships" xmlns:p="http://schemas.openxmlformats.org/presentationml/2006/main">
-  <p:cSld>
-    <p:spTree>
-      <p:nvGrpSpPr>
-        <p:cNvPr id="1" name=""/>
-        <p:cNvGrpSpPr/>
-        <p:nvPr/>
-      </p:nvGrpSpPr>
-      <p:grpSpPr>
-        <a:xfrm>
-          <a:off x="0" y="0"/>
-          <a:ext cx="0" cy="0"/>
-          <a:chOff x="0" y="0"/>
-          <a:chExt cx="0" cy="0"/>
-        </a:xfrm>
-      </p:grpSpPr>
-      <p:sp>
-        <p:nvSpPr>
-          <p:cNvPr id="2" name="Slide Image Placeholder 1"/>
-          <p:cNvSpPr>
-            <a:spLocks noGrp="1" noRot="1" noChangeAspect="1"/>
-          </p:cNvSpPr>
-          <p:nvPr>
-            <p:ph type="sldImg"/>
-          </p:nvPr>
-        </p:nvSpPr>
-        <p:spPr/>
-      </p:sp>
-      <p:sp>
-        <p:nvSpPr>
-          <p:cNvPr id="3" name="Notes Placeholder 2"/>
-          <p:cNvSpPr>
-            <a:spLocks noGrp="1"/>
-          </p:cNvSpPr>
-          <p:nvPr>
-            <p:ph type="body" idx="1"/>
-          </p:nvPr>
-        </p:nvSpPr>
-        <p:spPr/>
-        <p:txBody>
-          <a:bodyPr/>
-          <a:lstStyle/>
-          <a:p>
-            <a:r>
-              <a:rPr lang="en-US" dirty="0" smtClean="0"/>
-              <a:t>Register each view controller.</a:t>
-            </a:r>
-            <a:r>
-              <a:rPr lang="en-US" baseline="0" dirty="0" smtClean="0"/>
-              <a:t> </a:t>
-            </a:r>
-          </a:p>
-          <a:p>
-            <a:endParaRPr lang="en-US" baseline="0" dirty="0" smtClean="0"/>
-          </a:p>
-          <a:p>
-            <a:r>
-              <a:rPr lang="en-US" baseline="0" dirty="0" smtClean="0"/>
-              <a:t>Override </a:t>
-            </a:r>
-            <a:r>
-              <a:rPr lang="en-US" baseline="0" dirty="0" err="1" smtClean="0"/>
-              <a:t>ViewDidLoad</a:t>
-            </a:r>
-            <a:r>
-              <a:rPr lang="en-US" baseline="0" dirty="0" smtClean="0"/>
-              <a:t>, </a:t>
-            </a:r>
-            <a:r>
-              <a:rPr lang="en-US" baseline="0" dirty="0" err="1" smtClean="0"/>
-              <a:t>ViewWillAppear</a:t>
-            </a:r>
-            <a:r>
-              <a:rPr lang="en-US" baseline="0" dirty="0" smtClean="0"/>
-              <a:t>, </a:t>
-            </a:r>
-            <a:r>
-              <a:rPr lang="en-US" baseline="0" dirty="0" err="1" smtClean="0"/>
-              <a:t>ViewDidAppear</a:t>
-            </a:r>
-            <a:r>
-              <a:rPr lang="en-US" baseline="0" dirty="0" smtClean="0"/>
-              <a:t>…</a:t>
-            </a:r>
-            <a:endParaRPr lang="en-US" dirty="0"/>
-          </a:p>
-        </p:txBody>
-      </p:sp>
-    </p:spTree>
-    <p:extLst>
-      <p:ext uri="{BB962C8B-B14F-4D97-AF65-F5344CB8AC3E}">
-        <p14:creationId xmlns:p14="http://schemas.microsoft.com/office/powerpoint/2010/main" val="1947247215"/>
       </p:ext>
     </p:extLst>
   </p:cSld>
@@ -29731,6 +29800,126 @@
           <a:chExt cx="0" cy="0"/>
         </a:xfrm>
       </p:grpSpPr>
+      <p:sp>
+        <p:nvSpPr>
+          <p:cNvPr id="2" name="Title 1"/>
+          <p:cNvSpPr>
+            <a:spLocks noGrp="1"/>
+          </p:cNvSpPr>
+          <p:nvPr>
+            <p:ph type="title"/>
+          </p:nvPr>
+        </p:nvSpPr>
+        <p:spPr/>
+        <p:txBody>
+          <a:bodyPr/>
+          <a:lstStyle/>
+          <a:p>
+            <a:r>
+              <a:rPr lang="en-US" dirty="0" smtClean="0"/>
+              <a:t>Some existing type providers.</a:t>
+            </a:r>
+            <a:endParaRPr lang="en-US" dirty="0"/>
+          </a:p>
+        </p:txBody>
+      </p:sp>
+      <p:sp>
+        <p:nvSpPr>
+          <p:cNvPr id="8" name="Text Placeholder 7"/>
+          <p:cNvSpPr>
+            <a:spLocks noGrp="1"/>
+          </p:cNvSpPr>
+          <p:nvPr>
+            <p:ph type="body" idx="2"/>
+          </p:nvPr>
+        </p:nvSpPr>
+        <p:spPr/>
+        <p:txBody>
+          <a:bodyPr/>
+          <a:lstStyle/>
+          <a:p>
+            <a:r>
+              <a:rPr lang="en-US" dirty="0"/>
+              <a:t>See </a:t>
+            </a:r>
+            <a:r>
+              <a:rPr lang="en-US" dirty="0">
+                <a:hlinkClick r:id="rId2"/>
+              </a:rPr>
+              <a:t>here</a:t>
+            </a:r>
+            <a:r>
+              <a:rPr lang="en-US" dirty="0"/>
+              <a:t> for a full list. </a:t>
+            </a:r>
+          </a:p>
+          <a:p>
+            <a:endParaRPr lang="en-US" dirty="0"/>
+          </a:p>
+        </p:txBody>
+      </p:sp>
+      <p:graphicFrame>
+        <p:nvGraphicFramePr>
+          <p:cNvPr id="6" name="Content Placeholder 5"/>
+          <p:cNvGraphicFramePr>
+            <a:graphicFrameLocks noGrp="1"/>
+          </p:cNvGraphicFramePr>
+          <p:nvPr>
+            <p:ph sz="quarter" idx="1"/>
+            <p:extLst>
+              <p:ext uri="{D42A27DB-BD31-4B8C-83A1-F6EECF244321}">
+                <p14:modId xmlns:p14="http://schemas.microsoft.com/office/powerpoint/2010/main" val="3165634547"/>
+              </p:ext>
+            </p:extLst>
+          </p:nvPr>
+        </p:nvGraphicFramePr>
+        <p:xfrm>
+          <a:off x="3124200" y="571500"/>
+          <a:ext cx="5638800" cy="4508500"/>
+        </p:xfrm>
+        <a:graphic>
+          <a:graphicData uri="http://schemas.openxmlformats.org/drawingml/2006/diagram">
+            <dgm:relIds xmlns:dgm="http://schemas.openxmlformats.org/drawingml/2006/diagram" xmlns:r="http://schemas.openxmlformats.org/officeDocument/2006/relationships" r:dm="rId3" r:lo="rId4" r:qs="rId5" r:cs="rId6"/>
+          </a:graphicData>
+        </a:graphic>
+      </p:graphicFrame>
+    </p:spTree>
+    <p:extLst>
+      <p:ext uri="{BB962C8B-B14F-4D97-AF65-F5344CB8AC3E}">
+        <p14:creationId xmlns:p14="http://schemas.microsoft.com/office/powerpoint/2010/main" val="3016928814"/>
+      </p:ext>
+    </p:extLst>
+  </p:cSld>
+  <p:clrMapOvr>
+    <a:masterClrMapping/>
+  </p:clrMapOvr>
+  <p:timing>
+    <p:tnLst>
+      <p:par>
+        <p:cTn xmlns:p14="http://schemas.microsoft.com/office/powerpoint/2010/main" id="1" dur="indefinite" restart="never" nodeType="tmRoot"/>
+      </p:par>
+    </p:tnLst>
+  </p:timing>
+</p:sld>
+</file>
+
+<file path=ppt/slides/slide11.xml><?xml version="1.0" encoding="utf-8"?>
+<p:sld xmlns:a="http://schemas.openxmlformats.org/drawingml/2006/main" xmlns:r="http://schemas.openxmlformats.org/officeDocument/2006/relationships" xmlns:p="http://schemas.openxmlformats.org/presentationml/2006/main">
+  <p:cSld>
+    <p:spTree>
+      <p:nvGrpSpPr>
+        <p:cNvPr id="1" name=""/>
+        <p:cNvGrpSpPr/>
+        <p:nvPr/>
+      </p:nvGrpSpPr>
+      <p:grpSpPr>
+        <a:xfrm>
+          <a:off x="0" y="0"/>
+          <a:ext cx="0" cy="0"/>
+          <a:chOff x="0" y="0"/>
+          <a:chExt cx="0" cy="0"/>
+        </a:xfrm>
+      </p:grpSpPr>
       <p:graphicFrame>
         <p:nvGraphicFramePr>
           <p:cNvPr id="6" name="Content Placeholder 5"/>
@@ -29805,7 +29994,7 @@
 </p:sld>
 </file>
 
-<file path=ppt/slides/slide11.xml><?xml version="1.0" encoding="utf-8"?>
+<file path=ppt/slides/slide12.xml><?xml version="1.0" encoding="utf-8"?>
 <p:sld xmlns:a="http://schemas.openxmlformats.org/drawingml/2006/main" xmlns:r="http://schemas.openxmlformats.org/officeDocument/2006/relationships" xmlns:p="http://schemas.openxmlformats.org/presentationml/2006/main">
   <p:cSld>
     <p:spTree>
@@ -29894,7 +30083,7 @@
 </p:sld>
 </file>
 
-<file path=ppt/slides/slide12.xml><?xml version="1.0" encoding="utf-8"?>
+<file path=ppt/slides/slide13.xml><?xml version="1.0" encoding="utf-8"?>
 <p:sld xmlns:a="http://schemas.openxmlformats.org/drawingml/2006/main" xmlns:r="http://schemas.openxmlformats.org/officeDocument/2006/relationships" xmlns:p="http://schemas.openxmlformats.org/presentationml/2006/main">
   <p:cSld>
     <p:spTree>
@@ -30579,7 +30768,7 @@
 </p:sld>
 </file>
 
-<file path=ppt/slides/slide13.xml><?xml version="1.0" encoding="utf-8"?>
+<file path=ppt/slides/slide14.xml><?xml version="1.0" encoding="utf-8"?>
 <p:sld xmlns:a="http://schemas.openxmlformats.org/drawingml/2006/main" xmlns:r="http://schemas.openxmlformats.org/officeDocument/2006/relationships" xmlns:p="http://schemas.openxmlformats.org/presentationml/2006/main">
   <p:cSld>
     <p:spTree>
@@ -30719,7 +30908,7 @@
 </p:sld>
 </file>
 
-<file path=ppt/slides/slide14.xml><?xml version="1.0" encoding="utf-8"?>
+<file path=ppt/slides/slide15.xml><?xml version="1.0" encoding="utf-8"?>
 <p:sld xmlns:a="http://schemas.openxmlformats.org/drawingml/2006/main" xmlns:r="http://schemas.openxmlformats.org/officeDocument/2006/relationships" xmlns:p="http://schemas.openxmlformats.org/presentationml/2006/main">
   <p:cSld>
     <p:spTree>
@@ -30819,7 +31008,7 @@
 </p:sld>
 </file>
 
-<file path=ppt/slides/slide15.xml><?xml version="1.0" encoding="utf-8"?>
+<file path=ppt/slides/slide16.xml><?xml version="1.0" encoding="utf-8"?>
 <p:sld xmlns:a="http://schemas.openxmlformats.org/drawingml/2006/main" xmlns:r="http://schemas.openxmlformats.org/officeDocument/2006/relationships" xmlns:p="http://schemas.openxmlformats.org/presentationml/2006/main">
   <p:cSld>
     <p:spTree>
@@ -30917,7 +31106,7 @@
 </p:sld>
 </file>
 
-<file path=ppt/slides/slide16.xml><?xml version="1.0" encoding="utf-8"?>
+<file path=ppt/slides/slide17.xml><?xml version="1.0" encoding="utf-8"?>
 <p:sld xmlns:a="http://schemas.openxmlformats.org/drawingml/2006/main" xmlns:r="http://schemas.openxmlformats.org/officeDocument/2006/relationships" xmlns:p="http://schemas.openxmlformats.org/presentationml/2006/main">
   <p:cSld>
     <p:spTree>
@@ -30963,38 +31152,41 @@
       </p:sp>
       <p:pic>
         <p:nvPicPr>
-          <p:cNvPr id="4" name="Picture Placeholder 5"/>
+          <p:cNvPr id="2" name="7r742t.gif">
+            <a:hlinkClick r:id="" action="ppaction://media"/>
+          </p:cNvPr>
           <p:cNvPicPr>
             <a:picLocks noChangeAspect="1"/>
           </p:cNvPicPr>
-          <p:nvPr/>
+          <p:nvPr>
+            <a:videoFile r:link="rId2"/>
+            <p:extLst>
+              <p:ext uri="{DAA4B4D4-6D71-4841-9C94-3DE7FCFB9230}">
+                <p14:media xmlns:p14="http://schemas.microsoft.com/office/powerpoint/2010/main" r:embed="rId1"/>
+              </p:ext>
+            </p:extLst>
+          </p:nvPr>
         </p:nvPicPr>
-        <p:blipFill rotWithShape="1">
-          <a:blip r:embed="rId2" cstate="email">
-            <a:extLst>
-              <a:ext uri="{28A0092B-C50C-407E-A947-70E740481C1C}">
-                <a14:useLocalDpi xmlns:a14="http://schemas.microsoft.com/office/drawing/2010/main" val="0"/>
-              </a:ext>
-            </a:extLst>
-          </a:blip>
-          <a:srcRect l="469" t="-3534" r="-469" b="-3532"/>
-          <a:stretch/>
+        <p:blipFill>
+          <a:blip r:embed="rId4"/>
+          <a:stretch>
+            <a:fillRect/>
+          </a:stretch>
         </p:blipFill>
         <p:spPr>
           <a:xfrm>
-            <a:off x="2851471" y="2129264"/>
-            <a:ext cx="3440665" cy="3132882"/>
+            <a:off x="2102554" y="2287175"/>
+            <a:ext cx="5080000" cy="2857500"/>
           </a:xfrm>
           <a:prstGeom prst="rect">
             <a:avLst/>
           </a:prstGeom>
-          <a:ln w="57150" cmpd="thickThin">
-            <a:noFill/>
-            <a:miter lim="800000"/>
-          </a:ln>
-          <a:effectLst>
-            <a:softEdge rad="112500"/>
-          </a:effectLst>
+          <a:scene3d>
+            <a:camera prst="orthographicFront">
+              <a:rot lat="0" lon="0" rev="0"/>
+            </a:camera>
+            <a:lightRig rig="threePt" dir="t"/>
+          </a:scene3d>
         </p:spPr>
       </p:pic>
     </p:spTree>
@@ -31010,14 +31202,145 @@
   <p:timing>
     <p:tnLst>
       <p:par>
-        <p:cTn xmlns:p14="http://schemas.microsoft.com/office/powerpoint/2010/main" id="1" dur="indefinite" restart="never" nodeType="tmRoot"/>
+        <p:cTn xmlns:p14="http://schemas.microsoft.com/office/powerpoint/2010/main" id="1" dur="indefinite" restart="never" nodeType="tmRoot">
+          <p:childTnLst>
+            <p:seq concurrent="1" nextAc="seek">
+              <p:cTn id="2" dur="indefinite" nodeType="mainSeq">
+                <p:childTnLst>
+                  <p:par>
+                    <p:cTn id="3" fill="hold">
+                      <p:stCondLst>
+                        <p:cond delay="indefinite"/>
+                        <p:cond evt="onBegin" delay="0">
+                          <p:tn val="2"/>
+                        </p:cond>
+                      </p:stCondLst>
+                      <p:childTnLst>
+                        <p:par>
+                          <p:cTn id="4" fill="hold">
+                            <p:stCondLst>
+                              <p:cond delay="0"/>
+                            </p:stCondLst>
+                            <p:childTnLst>
+                              <p:par>
+                                <p:cTn id="5" presetID="1" presetClass="mediacall" presetSubtype="0" fill="hold" nodeType="afterEffect">
+                                  <p:stCondLst>
+                                    <p:cond delay="0"/>
+                                  </p:stCondLst>
+                                  <p:childTnLst>
+                                    <p:cmd type="call" cmd="playFrom(0.0)">
+                                      <p:cBhvr>
+                                        <p:cTn id="6" dur="2160" fill="hold"/>
+                                        <p:tgtEl>
+                                          <p:spTgt spid="2"/>
+                                        </p:tgtEl>
+                                      </p:cBhvr>
+                                    </p:cmd>
+                                  </p:childTnLst>
+                                </p:cTn>
+                              </p:par>
+                            </p:childTnLst>
+                          </p:cTn>
+                        </p:par>
+                      </p:childTnLst>
+                    </p:cTn>
+                  </p:par>
+                </p:childTnLst>
+              </p:cTn>
+              <p:prevCondLst>
+                <p:cond evt="onPrev" delay="0">
+                  <p:tgtEl>
+                    <p:sldTgt/>
+                  </p:tgtEl>
+                </p:cond>
+              </p:prevCondLst>
+              <p:nextCondLst>
+                <p:cond evt="onNext" delay="0">
+                  <p:tgtEl>
+                    <p:sldTgt/>
+                  </p:tgtEl>
+                </p:cond>
+              </p:nextCondLst>
+            </p:seq>
+            <p:video>
+              <p:cMediaNode vol="80000">
+                <p:cTn id="7" repeatCount="indefinite" fill="hold" display="0">
+                  <p:stCondLst>
+                    <p:cond delay="indefinite"/>
+                  </p:stCondLst>
+                </p:cTn>
+                <p:tgtEl>
+                  <p:spTgt spid="2"/>
+                </p:tgtEl>
+              </p:cMediaNode>
+            </p:video>
+            <p:seq concurrent="1" nextAc="seek">
+              <p:cTn id="8" restart="whenNotActive" fill="hold" evtFilter="cancelBubble" nodeType="interactiveSeq">
+                <p:stCondLst>
+                  <p:cond evt="onClick" delay="0">
+                    <p:tgtEl>
+                      <p:spTgt spid="2"/>
+                    </p:tgtEl>
+                  </p:cond>
+                </p:stCondLst>
+                <p:endSync evt="end" delay="0">
+                  <p:rtn val="all"/>
+                </p:endSync>
+                <p:childTnLst>
+                  <p:par>
+                    <p:cTn id="9" fill="hold">
+                      <p:stCondLst>
+                        <p:cond delay="0"/>
+                      </p:stCondLst>
+                      <p:childTnLst>
+                        <p:par>
+                          <p:cTn id="10" fill="hold">
+                            <p:stCondLst>
+                              <p:cond delay="0"/>
+                            </p:stCondLst>
+                            <p:childTnLst>
+                              <p:par>
+                                <p:cTn id="11" presetID="2" presetClass="mediacall" presetSubtype="0" fill="hold" nodeType="clickEffect">
+                                  <p:stCondLst>
+                                    <p:cond delay="0"/>
+                                  </p:stCondLst>
+                                  <p:childTnLst>
+                                    <p:cmd type="call" cmd="togglePause">
+                                      <p:cBhvr>
+                                        <p:cTn id="12" dur="1" fill="hold"/>
+                                        <p:tgtEl>
+                                          <p:spTgt spid="2"/>
+                                        </p:tgtEl>
+                                      </p:cBhvr>
+                                    </p:cmd>
+                                  </p:childTnLst>
+                                </p:cTn>
+                              </p:par>
+                            </p:childTnLst>
+                          </p:cTn>
+                        </p:par>
+                      </p:childTnLst>
+                    </p:cTn>
+                  </p:par>
+                </p:childTnLst>
+              </p:cTn>
+              <p:nextCondLst>
+                <p:cond evt="onClick" delay="0">
+                  <p:tgtEl>
+                    <p:spTgt spid="2"/>
+                  </p:tgtEl>
+                </p:cond>
+              </p:nextCondLst>
+            </p:seq>
+          </p:childTnLst>
+        </p:cTn>
       </p:par>
     </p:tnLst>
   </p:timing>
 </p:sld>
 </file>
 
-<file path=ppt/slides/slide17.xml><?xml version="1.0" encoding="utf-8"?>
+<file path=ppt/slides/slide18.xml><?xml version="1.0" encoding="utf-8"?>
 <p:sld xmlns:a="http://schemas.openxmlformats.org/drawingml/2006/main" xmlns:r="http://schemas.openxmlformats.org/officeDocument/2006/relationships" xmlns:p="http://schemas.openxmlformats.org/presentationml/2006/main">
   <p:cSld>
     <p:spTree>
@@ -31218,36 +31541,6 @@
           <a:chExt cx="0" cy="0"/>
         </a:xfrm>
       </p:grpSpPr>
-      <p:pic>
-        <p:nvPicPr>
-          <p:cNvPr id="6" name="Picture 5"/>
-          <p:cNvPicPr>
-            <a:picLocks noChangeAspect="1"/>
-          </p:cNvPicPr>
-          <p:nvPr/>
-        </p:nvPicPr>
-        <p:blipFill>
-          <a:blip r:embed="rId3">
-            <a:extLst>
-              <a:ext uri="{28A0092B-C50C-407E-A947-70E740481C1C}">
-                <a14:useLocalDpi xmlns:a14="http://schemas.microsoft.com/office/drawing/2010/main" val="0"/>
-              </a:ext>
-            </a:extLst>
-          </a:blip>
-          <a:stretch>
-            <a:fillRect/>
-          </a:stretch>
-        </p:blipFill>
-        <p:spPr>
-          <a:xfrm>
-            <a:off x="1990725" y="2469124"/>
-            <a:ext cx="5238749" cy="1704975"/>
-          </a:xfrm>
-          <a:prstGeom prst="rect">
-            <a:avLst/>
-          </a:prstGeom>
-        </p:spPr>
-      </p:pic>
       <p:sp>
         <p:nvSpPr>
           <p:cNvPr id="4" name="Title 3"/>
@@ -31293,16 +31586,43 @@
           <a:lstStyle/>
           <a:p>
             <a:pPr algn="ctr"/>
-            <a:r>
-              <a:rPr lang="en-US" sz="1600" dirty="0" smtClean="0">
-                <a:hlinkClick r:id="rId4"/>
-              </a:rPr>
-              <a:t>Quote of the Week blog post</a:t>
-            </a:r>
             <a:endParaRPr lang="en-US" sz="1600" dirty="0" smtClean="0"/>
           </a:p>
         </p:txBody>
       </p:sp>
+      <p:pic>
+        <p:nvPicPr>
+          <p:cNvPr id="5" name="7092.gif">
+            <a:hlinkClick r:id="" action="ppaction://media"/>
+          </p:cNvPr>
+          <p:cNvPicPr>
+            <a:picLocks noChangeAspect="1"/>
+          </p:cNvPicPr>
+          <p:nvPr>
+            <a:videoFile r:link="rId2"/>
+            <p:extLst>
+              <p:ext uri="{DAA4B4D4-6D71-4841-9C94-3DE7FCFB9230}">
+                <p14:media xmlns:p14="http://schemas.microsoft.com/office/powerpoint/2010/main" r:embed="rId1"/>
+              </p:ext>
+            </p:extLst>
+          </p:nvPr>
+        </p:nvPicPr>
+        <p:blipFill>
+          <a:blip r:embed="rId5"/>
+          <a:stretch>
+            <a:fillRect/>
+          </a:stretch>
+        </p:blipFill>
+        <p:spPr>
+          <a:xfrm>
+            <a:off x="1951974" y="2276999"/>
+            <a:ext cx="5254117" cy="2952813"/>
+          </a:xfrm>
+          <a:prstGeom prst="rect">
+            <a:avLst/>
+          </a:prstGeom>
+        </p:spPr>
+      </p:pic>
     </p:spTree>
     <p:extLst>
       <p:ext uri="{BB962C8B-B14F-4D97-AF65-F5344CB8AC3E}">
@@ -31316,7 +31636,138 @@
   <p:timing>
     <p:tnLst>
       <p:par>
-        <p:cTn xmlns:p14="http://schemas.microsoft.com/office/powerpoint/2010/main" id="1" dur="indefinite" restart="never" nodeType="tmRoot"/>
+        <p:cTn xmlns:p14="http://schemas.microsoft.com/office/powerpoint/2010/main" id="1" dur="indefinite" restart="never" nodeType="tmRoot">
+          <p:childTnLst>
+            <p:seq concurrent="1" nextAc="seek">
+              <p:cTn id="2" dur="indefinite" nodeType="mainSeq">
+                <p:childTnLst>
+                  <p:par>
+                    <p:cTn id="3" fill="hold">
+                      <p:stCondLst>
+                        <p:cond delay="indefinite"/>
+                        <p:cond evt="onBegin" delay="0">
+                          <p:tn val="2"/>
+                        </p:cond>
+                      </p:stCondLst>
+                      <p:childTnLst>
+                        <p:par>
+                          <p:cTn id="4" fill="hold">
+                            <p:stCondLst>
+                              <p:cond delay="0"/>
+                            </p:stCondLst>
+                            <p:childTnLst>
+                              <p:par>
+                                <p:cTn id="5" presetID="1" presetClass="mediacall" presetSubtype="0" fill="hold" nodeType="afterEffect">
+                                  <p:stCondLst>
+                                    <p:cond delay="0"/>
+                                  </p:stCondLst>
+                                  <p:childTnLst>
+                                    <p:cmd type="call" cmd="playFrom(0.0)">
+                                      <p:cBhvr>
+                                        <p:cTn id="6" dur="2000" fill="hold"/>
+                                        <p:tgtEl>
+                                          <p:spTgt spid="5"/>
+                                        </p:tgtEl>
+                                      </p:cBhvr>
+                                    </p:cmd>
+                                  </p:childTnLst>
+                                </p:cTn>
+                              </p:par>
+                            </p:childTnLst>
+                          </p:cTn>
+                        </p:par>
+                      </p:childTnLst>
+                    </p:cTn>
+                  </p:par>
+                </p:childTnLst>
+              </p:cTn>
+              <p:prevCondLst>
+                <p:cond evt="onPrev" delay="0">
+                  <p:tgtEl>
+                    <p:sldTgt/>
+                  </p:tgtEl>
+                </p:cond>
+              </p:prevCondLst>
+              <p:nextCondLst>
+                <p:cond evt="onNext" delay="0">
+                  <p:tgtEl>
+                    <p:sldTgt/>
+                  </p:tgtEl>
+                </p:cond>
+              </p:nextCondLst>
+            </p:seq>
+            <p:video>
+              <p:cMediaNode vol="80000">
+                <p:cTn id="7" repeatCount="indefinite" fill="hold" display="0">
+                  <p:stCondLst>
+                    <p:cond delay="indefinite"/>
+                  </p:stCondLst>
+                </p:cTn>
+                <p:tgtEl>
+                  <p:spTgt spid="5"/>
+                </p:tgtEl>
+              </p:cMediaNode>
+            </p:video>
+            <p:seq concurrent="1" nextAc="seek">
+              <p:cTn id="8" restart="whenNotActive" fill="hold" evtFilter="cancelBubble" nodeType="interactiveSeq">
+                <p:stCondLst>
+                  <p:cond evt="onClick" delay="0">
+                    <p:tgtEl>
+                      <p:spTgt spid="5"/>
+                    </p:tgtEl>
+                  </p:cond>
+                </p:stCondLst>
+                <p:endSync evt="end" delay="0">
+                  <p:rtn val="all"/>
+                </p:endSync>
+                <p:childTnLst>
+                  <p:par>
+                    <p:cTn id="9" fill="hold">
+                      <p:stCondLst>
+                        <p:cond delay="0"/>
+                      </p:stCondLst>
+                      <p:childTnLst>
+                        <p:par>
+                          <p:cTn id="10" fill="hold">
+                            <p:stCondLst>
+                              <p:cond delay="0"/>
+                            </p:stCondLst>
+                            <p:childTnLst>
+                              <p:par>
+                                <p:cTn id="11" presetID="2" presetClass="mediacall" presetSubtype="0" fill="hold" nodeType="clickEffect">
+                                  <p:stCondLst>
+                                    <p:cond delay="0"/>
+                                  </p:stCondLst>
+                                  <p:childTnLst>
+                                    <p:cmd type="call" cmd="togglePause">
+                                      <p:cBhvr>
+                                        <p:cTn id="12" dur="1" fill="hold"/>
+                                        <p:tgtEl>
+                                          <p:spTgt spid="5"/>
+                                        </p:tgtEl>
+                                      </p:cBhvr>
+                                    </p:cmd>
+                                  </p:childTnLst>
+                                </p:cTn>
+                              </p:par>
+                            </p:childTnLst>
+                          </p:cTn>
+                        </p:par>
+                      </p:childTnLst>
+                    </p:cTn>
+                  </p:par>
+                </p:childTnLst>
+              </p:cTn>
+              <p:nextCondLst>
+                <p:cond evt="onClick" delay="0">
+                  <p:tgtEl>
+                    <p:spTgt spid="5"/>
+                  </p:tgtEl>
+                </p:cond>
+              </p:nextCondLst>
+            </p:seq>
+          </p:childTnLst>
+        </p:cTn>
       </p:par>
     </p:tnLst>
   </p:timing>
@@ -32375,6 +32826,203 @@
           <a:chExt cx="0" cy="0"/>
         </a:xfrm>
       </p:grpSpPr>
+      <p:pic>
+        <p:nvPicPr>
+          <p:cNvPr id="6" name="Picture 5"/>
+          <p:cNvPicPr>
+            <a:picLocks noChangeAspect="1"/>
+          </p:cNvPicPr>
+          <p:nvPr/>
+        </p:nvPicPr>
+        <p:blipFill>
+          <a:blip r:embed="rId3">
+            <a:extLst>
+              <a:ext uri="{28A0092B-C50C-407E-A947-70E740481C1C}">
+                <a14:useLocalDpi xmlns:a14="http://schemas.microsoft.com/office/drawing/2010/main" val="0"/>
+              </a:ext>
+            </a:extLst>
+          </a:blip>
+          <a:stretch>
+            <a:fillRect/>
+          </a:stretch>
+        </p:blipFill>
+        <p:spPr>
+          <a:xfrm>
+            <a:off x="3255964" y="1281432"/>
+            <a:ext cx="5238749" cy="1704975"/>
+          </a:xfrm>
+          <a:prstGeom prst="rect">
+            <a:avLst/>
+          </a:prstGeom>
+        </p:spPr>
+      </p:pic>
+      <p:sp>
+        <p:nvSpPr>
+          <p:cNvPr id="7" name="TextBox 6"/>
+          <p:cNvSpPr txBox="1"/>
+          <p:nvPr/>
+        </p:nvSpPr>
+        <p:spPr>
+          <a:xfrm>
+            <a:off x="3255963" y="4709651"/>
+            <a:ext cx="5238749" cy="395485"/>
+          </a:xfrm>
+          <a:prstGeom prst="rect">
+            <a:avLst/>
+          </a:prstGeom>
+        </p:spPr>
+        <p:txBody>
+          <a:bodyPr vert="horz" wrap="none" rtlCol="0" anchor="ctr">
+            <a:normAutofit/>
+          </a:bodyPr>
+          <a:lstStyle/>
+          <a:p>
+            <a:pPr algn="ctr"/>
+            <a:r>
+              <a:rPr lang="en-US" sz="1600" dirty="0" smtClean="0">
+                <a:hlinkClick r:id="rId4"/>
+              </a:rPr>
+              <a:t>Quote of the Week blog post</a:t>
+            </a:r>
+            <a:endParaRPr lang="en-US" sz="1600" dirty="0" smtClean="0"/>
+          </a:p>
+        </p:txBody>
+      </p:sp>
+      <p:sp>
+        <p:nvSpPr>
+          <p:cNvPr id="8" name="Title 1"/>
+          <p:cNvSpPr txBox="1">
+            <a:spLocks/>
+          </p:cNvSpPr>
+          <p:nvPr/>
+        </p:nvSpPr>
+        <p:spPr>
+          <a:xfrm>
+            <a:off x="260579" y="762000"/>
+            <a:ext cx="2558425" cy="825500"/>
+          </a:xfrm>
+          <a:prstGeom prst="rect">
+            <a:avLst/>
+          </a:prstGeom>
+        </p:spPr>
+        <p:txBody>
+          <a:bodyPr vert="horz" anchor="b">
+            <a:noAutofit/>
+          </a:bodyPr>
+          <a:lstStyle>
+            <a:lvl1pPr algn="l" rtl="0" eaLnBrk="1" latinLnBrk="0" hangingPunct="1">
+              <a:spcBef>
+                <a:spcPct val="0"/>
+              </a:spcBef>
+              <a:buNone/>
+              <a:defRPr kumimoji="0" sz="2200" b="1" kern="1200">
+                <a:solidFill>
+                  <a:srgbClr val="FFFFFF"/>
+                </a:solidFill>
+                <a:latin typeface="+mj-lt"/>
+                <a:ea typeface="+mj-ea"/>
+                <a:cs typeface="+mj-cs"/>
+              </a:defRPr>
+            </a:lvl1pPr>
+          </a:lstStyle>
+          <a:p>
+            <a:endParaRPr lang="en-US" dirty="0"/>
+          </a:p>
+        </p:txBody>
+      </p:sp>
+      <p:sp>
+        <p:nvSpPr>
+          <p:cNvPr id="11" name="Text Placeholder 2"/>
+          <p:cNvSpPr>
+            <a:spLocks noGrp="1"/>
+          </p:cNvSpPr>
+          <p:nvPr>
+            <p:ph type="body" idx="2"/>
+          </p:nvPr>
+        </p:nvSpPr>
+        <p:spPr>
+          <a:xfrm>
+            <a:off x="260112" y="1650533"/>
+            <a:ext cx="2558425" cy="3454136"/>
+          </a:xfrm>
+        </p:spPr>
+        <p:txBody>
+          <a:bodyPr/>
+          <a:lstStyle/>
+          <a:p>
+            <a:r>
+              <a:rPr lang="en-US" dirty="0" smtClean="0"/>
+              <a:t>Option Types</a:t>
+            </a:r>
+            <a:endParaRPr lang="en-US" dirty="0"/>
+          </a:p>
+        </p:txBody>
+      </p:sp>
+      <p:sp>
+        <p:nvSpPr>
+          <p:cNvPr id="12" name="Title 1"/>
+          <p:cNvSpPr>
+            <a:spLocks noGrp="1"/>
+          </p:cNvSpPr>
+          <p:nvPr>
+            <p:ph type="title"/>
+          </p:nvPr>
+        </p:nvSpPr>
+        <p:spPr>
+          <a:xfrm>
+            <a:off x="260112" y="761533"/>
+            <a:ext cx="2558425" cy="825500"/>
+          </a:xfrm>
+        </p:spPr>
+        <p:txBody>
+          <a:bodyPr/>
+          <a:lstStyle/>
+          <a:p>
+            <a:r>
+              <a:rPr lang="en-US" dirty="0" smtClean="0"/>
+              <a:t>F# Fundamentals</a:t>
+            </a:r>
+            <a:endParaRPr lang="en-US" dirty="0"/>
+          </a:p>
+        </p:txBody>
+      </p:sp>
+    </p:spTree>
+    <p:extLst>
+      <p:ext uri="{BB962C8B-B14F-4D97-AF65-F5344CB8AC3E}">
+        <p14:creationId xmlns:p14="http://schemas.microsoft.com/office/powerpoint/2010/main" val="2944483430"/>
+      </p:ext>
+    </p:extLst>
+  </p:cSld>
+  <p:clrMapOvr>
+    <a:masterClrMapping/>
+  </p:clrMapOvr>
+  <p:timing>
+    <p:tnLst>
+      <p:par>
+        <p:cTn xmlns:p14="http://schemas.microsoft.com/office/powerpoint/2010/main" id="1" dur="indefinite" restart="never" nodeType="tmRoot"/>
+      </p:par>
+    </p:tnLst>
+  </p:timing>
+</p:sld>
+</file>
+
+<file path=ppt/slides/slide8.xml><?xml version="1.0" encoding="utf-8"?>
+<p:sld xmlns:a="http://schemas.openxmlformats.org/drawingml/2006/main" xmlns:r="http://schemas.openxmlformats.org/officeDocument/2006/relationships" xmlns:p="http://schemas.openxmlformats.org/presentationml/2006/main">
+  <p:cSld>
+    <p:spTree>
+      <p:nvGrpSpPr>
+        <p:cNvPr id="1" name=""/>
+        <p:cNvGrpSpPr/>
+        <p:nvPr/>
+      </p:nvGrpSpPr>
+      <p:grpSpPr>
+        <a:xfrm>
+          <a:off x="0" y="0"/>
+          <a:ext cx="0" cy="0"/>
+          <a:chOff x="0" y="0"/>
+          <a:chExt cx="0" cy="0"/>
+        </a:xfrm>
+      </p:grpSpPr>
       <p:sp>
         <p:nvSpPr>
           <p:cNvPr id="3" name="Text Placeholder 2"/>
@@ -32476,7 +33124,7 @@
 </p:sld>
 </file>
 
-<file path=ppt/slides/slide8.xml><?xml version="1.0" encoding="utf-8"?>
+<file path=ppt/slides/slide9.xml><?xml version="1.0" encoding="utf-8"?>
 <p:sld xmlns:a="http://schemas.openxmlformats.org/drawingml/2006/main" xmlns:r="http://schemas.openxmlformats.org/officeDocument/2006/relationships" xmlns:p="http://schemas.openxmlformats.org/presentationml/2006/main">
   <p:cSld>
     <p:spTree>
@@ -32550,126 +33198,6 @@
     <p:extLst>
       <p:ext uri="{BB962C8B-B14F-4D97-AF65-F5344CB8AC3E}">
         <p14:creationId xmlns:p14="http://schemas.microsoft.com/office/powerpoint/2010/main" val="1413902312"/>
-      </p:ext>
-    </p:extLst>
-  </p:cSld>
-  <p:clrMapOvr>
-    <a:masterClrMapping/>
-  </p:clrMapOvr>
-  <p:timing>
-    <p:tnLst>
-      <p:par>
-        <p:cTn xmlns:p14="http://schemas.microsoft.com/office/powerpoint/2010/main" id="1" dur="indefinite" restart="never" nodeType="tmRoot"/>
-      </p:par>
-    </p:tnLst>
-  </p:timing>
-</p:sld>
-</file>
-
-<file path=ppt/slides/slide9.xml><?xml version="1.0" encoding="utf-8"?>
-<p:sld xmlns:a="http://schemas.openxmlformats.org/drawingml/2006/main" xmlns:r="http://schemas.openxmlformats.org/officeDocument/2006/relationships" xmlns:p="http://schemas.openxmlformats.org/presentationml/2006/main">
-  <p:cSld>
-    <p:spTree>
-      <p:nvGrpSpPr>
-        <p:cNvPr id="1" name=""/>
-        <p:cNvGrpSpPr/>
-        <p:nvPr/>
-      </p:nvGrpSpPr>
-      <p:grpSpPr>
-        <a:xfrm>
-          <a:off x="0" y="0"/>
-          <a:ext cx="0" cy="0"/>
-          <a:chOff x="0" y="0"/>
-          <a:chExt cx="0" cy="0"/>
-        </a:xfrm>
-      </p:grpSpPr>
-      <p:sp>
-        <p:nvSpPr>
-          <p:cNvPr id="2" name="Title 1"/>
-          <p:cNvSpPr>
-            <a:spLocks noGrp="1"/>
-          </p:cNvSpPr>
-          <p:nvPr>
-            <p:ph type="title"/>
-          </p:nvPr>
-        </p:nvSpPr>
-        <p:spPr/>
-        <p:txBody>
-          <a:bodyPr/>
-          <a:lstStyle/>
-          <a:p>
-            <a:r>
-              <a:rPr lang="en-US" dirty="0" smtClean="0"/>
-              <a:t>Some existing type providers.</a:t>
-            </a:r>
-            <a:endParaRPr lang="en-US" dirty="0"/>
-          </a:p>
-        </p:txBody>
-      </p:sp>
-      <p:sp>
-        <p:nvSpPr>
-          <p:cNvPr id="8" name="Text Placeholder 7"/>
-          <p:cNvSpPr>
-            <a:spLocks noGrp="1"/>
-          </p:cNvSpPr>
-          <p:nvPr>
-            <p:ph type="body" idx="2"/>
-          </p:nvPr>
-        </p:nvSpPr>
-        <p:spPr/>
-        <p:txBody>
-          <a:bodyPr/>
-          <a:lstStyle/>
-          <a:p>
-            <a:r>
-              <a:rPr lang="en-US" dirty="0"/>
-              <a:t>See </a:t>
-            </a:r>
-            <a:r>
-              <a:rPr lang="en-US" dirty="0">
-                <a:hlinkClick r:id="rId2"/>
-              </a:rPr>
-              <a:t>here</a:t>
-            </a:r>
-            <a:r>
-              <a:rPr lang="en-US" dirty="0"/>
-              <a:t> for a full list. </a:t>
-            </a:r>
-          </a:p>
-          <a:p>
-            <a:endParaRPr lang="en-US" dirty="0"/>
-          </a:p>
-        </p:txBody>
-      </p:sp>
-      <p:graphicFrame>
-        <p:nvGraphicFramePr>
-          <p:cNvPr id="6" name="Content Placeholder 5"/>
-          <p:cNvGraphicFramePr>
-            <a:graphicFrameLocks noGrp="1"/>
-          </p:cNvGraphicFramePr>
-          <p:nvPr>
-            <p:ph sz="quarter" idx="1"/>
-            <p:extLst>
-              <p:ext uri="{D42A27DB-BD31-4B8C-83A1-F6EECF244321}">
-                <p14:modId xmlns:p14="http://schemas.microsoft.com/office/powerpoint/2010/main" val="3165634547"/>
-              </p:ext>
-            </p:extLst>
-          </p:nvPr>
-        </p:nvGraphicFramePr>
-        <p:xfrm>
-          <a:off x="3124200" y="571500"/>
-          <a:ext cx="5638800" cy="4508500"/>
-        </p:xfrm>
-        <a:graphic>
-          <a:graphicData uri="http://schemas.openxmlformats.org/drawingml/2006/diagram">
-            <dgm:relIds xmlns:dgm="http://schemas.openxmlformats.org/drawingml/2006/diagram" xmlns:r="http://schemas.openxmlformats.org/officeDocument/2006/relationships" r:dm="rId3" r:lo="rId4" r:qs="rId5" r:cs="rId6"/>
-          </a:graphicData>
-        </a:graphic>
-      </p:graphicFrame>
-    </p:spTree>
-    <p:extLst>
-      <p:ext uri="{BB962C8B-B14F-4D97-AF65-F5344CB8AC3E}">
-        <p14:creationId xmlns:p14="http://schemas.microsoft.com/office/powerpoint/2010/main" val="3016928814"/>
       </p:ext>
     </p:extLst>
   </p:cSld>

</xml_diff>

<commit_message>
Updating nuget packages & type provider examples.
</commit_message>
<xml_diff>
--- a/Intro to Xamarin F#/F#-iOS.pptx
+++ b/Intro to Xamarin F#/F#-iOS.pptx
@@ -177,7 +177,7 @@
       </p14:sectionLst>
     </p:ext>
     <p:ext uri="{EFAFB233-063F-42B5-8137-9DF3F51BA10A}">
-      <p15:sldGuideLst xmlns="" xmlns:p15="http://schemas.microsoft.com/office/powerpoint/2012/main"/>
+      <p15:sldGuideLst xmlns:p15="http://schemas.microsoft.com/office/powerpoint/2012/main" xmlns=""/>
     </p:ext>
   </p:extLst>
 </p:presentation>
@@ -9064,53 +9064,53 @@
     </dgm:pt>
   </dgm:ptLst>
   <dgm:cxnLst>
+    <dgm:cxn modelId="{7B289421-D34D-4D74-859B-AC7E21915524}" srcId="{AD95B609-3303-4583-87CD-2E7F35A6232A}" destId="{C10C8E44-53F0-4A95-B9E0-2C9674291AA8}" srcOrd="3" destOrd="0" parTransId="{920BB62B-541D-4CE3-A066-A85B338438D5}" sibTransId="{061A730A-78F6-4A11-99AC-7B30F084080D}"/>
+    <dgm:cxn modelId="{E840FF57-B382-423C-81EB-BAE38A169A99}" type="presOf" srcId="{819C193B-EAAC-476D-87A2-67263294D4D7}" destId="{F584A7AF-7AC4-466A-8058-C318E2452A4B}" srcOrd="0" destOrd="0" presId="urn:microsoft.com/office/officeart/2009/3/layout/SubStepProcess"/>
+    <dgm:cxn modelId="{96CAADBA-F321-46B8-98E3-BEBA2FD7B912}" srcId="{AD95B609-3303-4583-87CD-2E7F35A6232A}" destId="{6A3553B0-7A40-4A90-8516-16E3CA923718}" srcOrd="9" destOrd="0" parTransId="{978F89D0-B7DF-472A-9B03-C03A2DAC6155}" sibTransId="{02616C06-F1C3-427F-A227-7AC767461962}"/>
+    <dgm:cxn modelId="{2272C4A2-DBEA-444D-A06E-3431E02455D7}" type="presOf" srcId="{5F3E792C-E8E1-476D-A80F-9499729EB818}" destId="{930BC43C-89CA-4487-8A31-9FD4482A7DBB}" srcOrd="0" destOrd="0" presId="urn:microsoft.com/office/officeart/2009/3/layout/SubStepProcess"/>
+    <dgm:cxn modelId="{851DB145-7372-4AC1-AF6A-D698EF9EE1BC}" srcId="{AD95B609-3303-4583-87CD-2E7F35A6232A}" destId="{09EA8485-884F-484C-A626-8D7CC15A3984}" srcOrd="0" destOrd="0" parTransId="{5FB69482-A19E-4427-96EA-07A3C9999C37}" sibTransId="{8AAC2FF5-D3FB-432C-861F-AB07B94A8D17}"/>
+    <dgm:cxn modelId="{FFAB0640-BE7B-46C0-8665-26BD249B3807}" srcId="{95BAF3F2-D109-4E98-938E-0D603B5A9F7E}" destId="{C8DEEE97-A2B3-4862-9DF2-3CEFFDAFBD8C}" srcOrd="2" destOrd="0" parTransId="{C7B2C226-A6D5-4834-8096-D1248E9CC62E}" sibTransId="{91CF8BD8-BFB9-40E3-853E-F90C6E8E6A13}"/>
+    <dgm:cxn modelId="{8D2262FF-7BD1-412A-89FC-76A2FD0DB228}" srcId="{5F3E792C-E8E1-476D-A80F-9499729EB818}" destId="{E68E75D6-761A-40F6-92D7-5D34BDFDED6B}" srcOrd="4" destOrd="0" parTransId="{D57684C3-5833-4939-84F3-9DB3A7B8355B}" sibTransId="{67C4EF1D-D1C6-4DFB-8AB4-0F125B825D49}"/>
+    <dgm:cxn modelId="{67E122BD-5A88-4BC5-87A2-0BD09F7B29C1}" srcId="{AD95B609-3303-4583-87CD-2E7F35A6232A}" destId="{601322D6-BAE4-4D1D-BCE6-6DCA32544F9C}" srcOrd="8" destOrd="0" parTransId="{637D7C5F-8769-4305-8D07-D59FE1FD1DE7}" sibTransId="{54996A8C-05FB-49D6-A511-AB405B78FA03}"/>
+    <dgm:cxn modelId="{BBD5550C-232A-4358-A34B-E691CB70D253}" type="presOf" srcId="{D606B092-3F2D-43A2-91A0-195B86BD53DA}" destId="{DACE86A9-A05C-4CA3-83EC-40A63736638E}" srcOrd="0" destOrd="0" presId="urn:microsoft.com/office/officeart/2009/3/layout/SubStepProcess"/>
+    <dgm:cxn modelId="{403898F6-0BAD-4688-A767-D217A8C683D4}" srcId="{5F3E792C-E8E1-476D-A80F-9499729EB818}" destId="{0F6B5F89-03F0-4758-83E8-D38163FD5BDE}" srcOrd="2" destOrd="0" parTransId="{EBA221A6-4FBA-4E6B-B225-DD14D670EBEA}" sibTransId="{5E04DA45-E29B-461D-82AB-215C64D40866}"/>
+    <dgm:cxn modelId="{F8EEC1A3-BCEC-47CB-A295-ED345B1CA661}" srcId="{5F3E792C-E8E1-476D-A80F-9499729EB818}" destId="{89511B21-2A9E-472A-9A95-A6CC8E5FAADC}" srcOrd="3" destOrd="0" parTransId="{D05D4F68-E719-460B-9F4E-58BD7CE28669}" sibTransId="{75834831-EB4A-4A18-B9A1-240FBBF0B096}"/>
+    <dgm:cxn modelId="{F48F5137-40DB-4A59-99E3-0E978E3DEF58}" srcId="{AD95B609-3303-4583-87CD-2E7F35A6232A}" destId="{923AF866-B32B-4260-B12C-2D9D1E7F500A}" srcOrd="6" destOrd="0" parTransId="{AF943EA0-1A4F-46EE-A05F-E3454E545030}" sibTransId="{A687BB37-1EE6-4B22-8B58-BC618FF5F169}"/>
+    <dgm:cxn modelId="{3F9DF11D-9E55-40DB-828E-94E39C910C39}" srcId="{95BAF3F2-D109-4E98-938E-0D603B5A9F7E}" destId="{AD95B609-3303-4583-87CD-2E7F35A6232A}" srcOrd="0" destOrd="0" parTransId="{CA20A938-4752-4205-AB97-93C91C21D438}" sibTransId="{3B9797B8-1C0C-4F3D-B18B-50FEFFD6A0E1}"/>
+    <dgm:cxn modelId="{0844B31D-EA76-413B-90AD-5BC0795A08EC}" type="presOf" srcId="{95BAF3F2-D109-4E98-938E-0D603B5A9F7E}" destId="{4144592D-B1E6-44E0-B992-396491D46FD6}" srcOrd="0" destOrd="0" presId="urn:microsoft.com/office/officeart/2009/3/layout/SubStepProcess"/>
+    <dgm:cxn modelId="{4FC88EA4-07E8-46D1-9E82-24A7A8C10B6D}" type="presOf" srcId="{C10C8E44-53F0-4A95-B9E0-2C9674291AA8}" destId="{71035CB5-025D-4273-8618-B75128118237}" srcOrd="0" destOrd="0" presId="urn:microsoft.com/office/officeart/2009/3/layout/SubStepProcess"/>
+    <dgm:cxn modelId="{F1AFFDE5-DD20-4815-BF43-D769DB44BACA}" srcId="{5F3E792C-E8E1-476D-A80F-9499729EB818}" destId="{D606B092-3F2D-43A2-91A0-195B86BD53DA}" srcOrd="0" destOrd="0" parTransId="{66219553-9A84-45B1-A624-9936C43E8047}" sibTransId="{A7BB68E8-CFE5-41C3-8EF5-4BD28FD84C12}"/>
+    <dgm:cxn modelId="{A3957A6C-D036-469E-B3D1-F88D60B75E43}" type="presOf" srcId="{D30CC538-6A3E-4ABF-A7CF-4766B1619AA9}" destId="{847583CB-3949-4F46-92DF-5BC70B8A4826}" srcOrd="0" destOrd="0" presId="urn:microsoft.com/office/officeart/2009/3/layout/SubStepProcess"/>
+    <dgm:cxn modelId="{8B1CD69F-17F8-408D-9317-3FFF303D955D}" srcId="{5F3E792C-E8E1-476D-A80F-9499729EB818}" destId="{F0E93695-53B8-4FC4-A086-1D1368A1D979}" srcOrd="5" destOrd="0" parTransId="{CECFB84A-5A6F-4AF8-A5F1-6D04D4FFEA8C}" sibTransId="{748B5E76-AAE3-42CC-A068-BA09A8FF52F7}"/>
+    <dgm:cxn modelId="{54F418C8-B003-4C3E-9127-5F1AB7C5EAB9}" type="presOf" srcId="{6A3553B0-7A40-4A90-8516-16E3CA923718}" destId="{5C20E412-C74A-48DA-A2A0-6CC529AF4FA3}" srcOrd="0" destOrd="0" presId="urn:microsoft.com/office/officeart/2009/3/layout/SubStepProcess"/>
+    <dgm:cxn modelId="{26413D1F-B4DC-42ED-9508-59902F295F56}" type="presOf" srcId="{C8DEEE97-A2B3-4862-9DF2-3CEFFDAFBD8C}" destId="{8F724D7A-FC3E-4ECA-A525-6E3BA44424E6}" srcOrd="0" destOrd="0" presId="urn:microsoft.com/office/officeart/2009/3/layout/SubStepProcess"/>
+    <dgm:cxn modelId="{25B05C16-2E1D-4598-A63C-2EBA88E4E99E}" srcId="{AD95B609-3303-4583-87CD-2E7F35A6232A}" destId="{C9FBCAE5-829B-4790-8E80-1EECA1A01A54}" srcOrd="7" destOrd="0" parTransId="{7A836164-CEBD-48A7-AC9C-F5DD82973333}" sibTransId="{EE61A56A-8119-4850-BEBC-D362BADC6A72}"/>
+    <dgm:cxn modelId="{4C37B3D5-3822-43C1-924F-09811DAEA3A9}" srcId="{C8DEEE97-A2B3-4862-9DF2-3CEFFDAFBD8C}" destId="{8A2B1C81-E47D-47F9-AF76-7772C9C66239}" srcOrd="0" destOrd="0" parTransId="{C182E80D-2B6A-40C0-A10D-D2F624D54BBD}" sibTransId="{9F3FC4D9-FE32-489C-B204-29B67185D75E}"/>
+    <dgm:cxn modelId="{2BF4C107-6A6D-4E8E-849D-47619B617BC8}" type="presOf" srcId="{601322D6-BAE4-4D1D-BCE6-6DCA32544F9C}" destId="{91B759A7-7C2B-4E54-BA5E-24E6B1B5CF56}" srcOrd="0" destOrd="0" presId="urn:microsoft.com/office/officeart/2009/3/layout/SubStepProcess"/>
+    <dgm:cxn modelId="{CD0E5135-9AEC-43CF-9708-D51FAE0A47E7}" srcId="{C8DEEE97-A2B3-4862-9DF2-3CEFFDAFBD8C}" destId="{FB911FC4-0553-4EE8-B15D-6BC139993559}" srcOrd="2" destOrd="0" parTransId="{888E84C5-66E0-4C28-A734-38304805F82E}" sibTransId="{DEFD4263-88D9-490E-87EF-714CEEB943C7}"/>
+    <dgm:cxn modelId="{D1CF7A31-8599-46BA-90C2-84F1F54679FB}" type="presOf" srcId="{0F6B5F89-03F0-4758-83E8-D38163FD5BDE}" destId="{26448DDA-E83C-4832-BD33-7AA9AE7A1FBD}" srcOrd="0" destOrd="0" presId="urn:microsoft.com/office/officeart/2009/3/layout/SubStepProcess"/>
     <dgm:cxn modelId="{6268C07B-C038-4857-8651-1893FD20867D}" srcId="{AD95B609-3303-4583-87CD-2E7F35A6232A}" destId="{D30CC538-6A3E-4ABF-A7CF-4766B1619AA9}" srcOrd="4" destOrd="0" parTransId="{B2821827-82C3-4E38-B688-D3944481D084}" sibTransId="{BF6AAC22-75F1-42CE-B071-35E223068637}"/>
-    <dgm:cxn modelId="{F8EEC1A3-BCEC-47CB-A295-ED345B1CA661}" srcId="{5F3E792C-E8E1-476D-A80F-9499729EB818}" destId="{89511B21-2A9E-472A-9A95-A6CC8E5FAADC}" srcOrd="3" destOrd="0" parTransId="{D05D4F68-E719-460B-9F4E-58BD7CE28669}" sibTransId="{75834831-EB4A-4A18-B9A1-240FBBF0B096}"/>
-    <dgm:cxn modelId="{BBD5550C-232A-4358-A34B-E691CB70D253}" type="presOf" srcId="{D606B092-3F2D-43A2-91A0-195B86BD53DA}" destId="{DACE86A9-A05C-4CA3-83EC-40A63736638E}" srcOrd="0" destOrd="0" presId="urn:microsoft.com/office/officeart/2009/3/layout/SubStepProcess"/>
-    <dgm:cxn modelId="{96CAADBA-F321-46B8-98E3-BEBA2FD7B912}" srcId="{AD95B609-3303-4583-87CD-2E7F35A6232A}" destId="{6A3553B0-7A40-4A90-8516-16E3CA923718}" srcOrd="9" destOrd="0" parTransId="{978F89D0-B7DF-472A-9B03-C03A2DAC6155}" sibTransId="{02616C06-F1C3-427F-A227-7AC767461962}"/>
-    <dgm:cxn modelId="{377FACA8-B085-47AC-B304-A0E88863179D}" type="presOf" srcId="{89511B21-2A9E-472A-9A95-A6CC8E5FAADC}" destId="{CD82906B-C356-4E42-B320-83690748577F}" srcOrd="0" destOrd="0" presId="urn:microsoft.com/office/officeart/2009/3/layout/SubStepProcess"/>
-    <dgm:cxn modelId="{A3957A6C-D036-469E-B3D1-F88D60B75E43}" type="presOf" srcId="{D30CC538-6A3E-4ABF-A7CF-4766B1619AA9}" destId="{847583CB-3949-4F46-92DF-5BC70B8A4826}" srcOrd="0" destOrd="0" presId="urn:microsoft.com/office/officeart/2009/3/layout/SubStepProcess"/>
-    <dgm:cxn modelId="{8E97018E-B7DF-4E20-8722-CCCA4B5E1266}" type="presOf" srcId="{9C8E4A14-3A8E-458D-8E2C-9E6CF1CCC4B0}" destId="{64ECA41F-8C16-4299-9A9C-307AD1C48C43}" srcOrd="0" destOrd="0" presId="urn:microsoft.com/office/officeart/2009/3/layout/SubStepProcess"/>
-    <dgm:cxn modelId="{D3AF6C03-A3CB-480F-97B6-3EE9EAD07334}" type="presOf" srcId="{AD95B609-3303-4583-87CD-2E7F35A6232A}" destId="{ECA4621E-2E99-4BEF-9592-8A07D21B3E61}" srcOrd="0" destOrd="0" presId="urn:microsoft.com/office/officeart/2009/3/layout/SubStepProcess"/>
-    <dgm:cxn modelId="{F1AFFDE5-DD20-4815-BF43-D769DB44BACA}" srcId="{5F3E792C-E8E1-476D-A80F-9499729EB818}" destId="{D606B092-3F2D-43A2-91A0-195B86BD53DA}" srcOrd="0" destOrd="0" parTransId="{66219553-9A84-45B1-A624-9936C43E8047}" sibTransId="{A7BB68E8-CFE5-41C3-8EF5-4BD28FD84C12}"/>
-    <dgm:cxn modelId="{67E122BD-5A88-4BC5-87A2-0BD09F7B29C1}" srcId="{AD95B609-3303-4583-87CD-2E7F35A6232A}" destId="{601322D6-BAE4-4D1D-BCE6-6DCA32544F9C}" srcOrd="8" destOrd="0" parTransId="{637D7C5F-8769-4305-8D07-D59FE1FD1DE7}" sibTransId="{54996A8C-05FB-49D6-A511-AB405B78FA03}"/>
-    <dgm:cxn modelId="{068E6F1E-736A-46C5-B02A-C306EA3B88EC}" srcId="{AD95B609-3303-4583-87CD-2E7F35A6232A}" destId="{C0E686F4-07E0-48F0-9175-5A4E8D81D8F8}" srcOrd="2" destOrd="0" parTransId="{AB56B838-13C1-4272-A57B-C7EBE9D83F0E}" sibTransId="{C2B9156C-1718-44F9-961C-87D932C09337}"/>
-    <dgm:cxn modelId="{8D2262FF-7BD1-412A-89FC-76A2FD0DB228}" srcId="{5F3E792C-E8E1-476D-A80F-9499729EB818}" destId="{E68E75D6-761A-40F6-92D7-5D34BDFDED6B}" srcOrd="4" destOrd="0" parTransId="{D57684C3-5833-4939-84F3-9DB3A7B8355B}" sibTransId="{67C4EF1D-D1C6-4DFB-8AB4-0F125B825D49}"/>
-    <dgm:cxn modelId="{434BDFE1-C15D-40CC-A54F-F9725EADEFA2}" type="presOf" srcId="{33060EEB-721D-46E8-A715-2FC01D6BD15A}" destId="{875414DA-731F-42C8-985C-69C9D4D037D6}" srcOrd="0" destOrd="0" presId="urn:microsoft.com/office/officeart/2009/3/layout/SubStepProcess"/>
-    <dgm:cxn modelId="{4C37B3D5-3822-43C1-924F-09811DAEA3A9}" srcId="{C8DEEE97-A2B3-4862-9DF2-3CEFFDAFBD8C}" destId="{8A2B1C81-E47D-47F9-AF76-7772C9C66239}" srcOrd="0" destOrd="0" parTransId="{C182E80D-2B6A-40C0-A10D-D2F624D54BBD}" sibTransId="{9F3FC4D9-FE32-489C-B204-29B67185D75E}"/>
-    <dgm:cxn modelId="{5F736D82-879F-4B3C-913F-3051C7E05534}" type="presOf" srcId="{FB911FC4-0553-4EE8-B15D-6BC139993559}" destId="{F80CB992-25F3-4146-990C-CB3F855D4E45}" srcOrd="0" destOrd="0" presId="urn:microsoft.com/office/officeart/2009/3/layout/SubStepProcess"/>
-    <dgm:cxn modelId="{D1CF7A31-8599-46BA-90C2-84F1F54679FB}" type="presOf" srcId="{0F6B5F89-03F0-4758-83E8-D38163FD5BDE}" destId="{26448DDA-E83C-4832-BD33-7AA9AE7A1FBD}" srcOrd="0" destOrd="0" presId="urn:microsoft.com/office/officeart/2009/3/layout/SubStepProcess"/>
-    <dgm:cxn modelId="{80D65BB7-863C-43A0-B16C-EE8308742636}" type="presOf" srcId="{C0E686F4-07E0-48F0-9175-5A4E8D81D8F8}" destId="{389E0D84-76EC-4FFF-A4B8-7C47016BC1F8}" srcOrd="0" destOrd="0" presId="urn:microsoft.com/office/officeart/2009/3/layout/SubStepProcess"/>
-    <dgm:cxn modelId="{CD0E5135-9AEC-43CF-9708-D51FAE0A47E7}" srcId="{C8DEEE97-A2B3-4862-9DF2-3CEFFDAFBD8C}" destId="{FB911FC4-0553-4EE8-B15D-6BC139993559}" srcOrd="2" destOrd="0" parTransId="{888E84C5-66E0-4C28-A734-38304805F82E}" sibTransId="{DEFD4263-88D9-490E-87EF-714CEEB943C7}"/>
-    <dgm:cxn modelId="{198D3979-2267-4660-8977-14D75A3B4E78}" srcId="{5F3E792C-E8E1-476D-A80F-9499729EB818}" destId="{9C8E4A14-3A8E-458D-8E2C-9E6CF1CCC4B0}" srcOrd="6" destOrd="0" parTransId="{A04CC4F2-75DE-4F68-A745-417004977698}" sibTransId="{C848A657-410B-47FE-97E4-32DE211692A4}"/>
-    <dgm:cxn modelId="{26413D1F-B4DC-42ED-9508-59902F295F56}" type="presOf" srcId="{C8DEEE97-A2B3-4862-9DF2-3CEFFDAFBD8C}" destId="{8F724D7A-FC3E-4ECA-A525-6E3BA44424E6}" srcOrd="0" destOrd="0" presId="urn:microsoft.com/office/officeart/2009/3/layout/SubStepProcess"/>
-    <dgm:cxn modelId="{403898F6-0BAD-4688-A767-D217A8C683D4}" srcId="{5F3E792C-E8E1-476D-A80F-9499729EB818}" destId="{0F6B5F89-03F0-4758-83E8-D38163FD5BDE}" srcOrd="2" destOrd="0" parTransId="{EBA221A6-4FBA-4E6B-B225-DD14D670EBEA}" sibTransId="{5E04DA45-E29B-461D-82AB-215C64D40866}"/>
-    <dgm:cxn modelId="{2BF4C107-6A6D-4E8E-849D-47619B617BC8}" type="presOf" srcId="{601322D6-BAE4-4D1D-BCE6-6DCA32544F9C}" destId="{91B759A7-7C2B-4E54-BA5E-24E6B1B5CF56}" srcOrd="0" destOrd="0" presId="urn:microsoft.com/office/officeart/2009/3/layout/SubStepProcess"/>
-    <dgm:cxn modelId="{8140EE19-556D-4E7E-A353-1E233B3F5AC0}" type="presOf" srcId="{EDD1FF38-46FD-4A03-BCBE-20400FF7D1C8}" destId="{5D0F8DBC-FA8A-4ACB-A014-076E69604080}" srcOrd="0" destOrd="0" presId="urn:microsoft.com/office/officeart/2009/3/layout/SubStepProcess"/>
-    <dgm:cxn modelId="{34BEB09E-E2A5-4DF6-B8E2-B6D70FF4B1CF}" type="presOf" srcId="{C9FBCAE5-829B-4790-8E80-1EECA1A01A54}" destId="{B69F6CCC-94E3-460A-9C6F-EB373D226EE5}" srcOrd="0" destOrd="0" presId="urn:microsoft.com/office/officeart/2009/3/layout/SubStepProcess"/>
-    <dgm:cxn modelId="{DAA1C1C8-0688-4806-8A68-F6112A67A090}" srcId="{5F3E792C-E8E1-476D-A80F-9499729EB818}" destId="{819C193B-EAAC-476D-87A2-67263294D4D7}" srcOrd="1" destOrd="0" parTransId="{8399B9EE-C7E2-4231-A7C8-EA226A9367CB}" sibTransId="{79E766F7-3576-4828-BC83-6F97132DFE01}"/>
-    <dgm:cxn modelId="{4FC88EA4-07E8-46D1-9E82-24A7A8C10B6D}" type="presOf" srcId="{C10C8E44-53F0-4A95-B9E0-2C9674291AA8}" destId="{71035CB5-025D-4273-8618-B75128118237}" srcOrd="0" destOrd="0" presId="urn:microsoft.com/office/officeart/2009/3/layout/SubStepProcess"/>
-    <dgm:cxn modelId="{5BD6DBEF-E391-4FA4-B6E3-2F80ED0491B5}" type="presOf" srcId="{09EA8485-884F-484C-A626-8D7CC15A3984}" destId="{CA782425-D4E6-4F03-9D7E-94A648C70890}" srcOrd="0" destOrd="0" presId="urn:microsoft.com/office/officeart/2009/3/layout/SubStepProcess"/>
     <dgm:cxn modelId="{3DF45BE5-B035-4FF1-880E-D6735D0B4C8C}" type="presOf" srcId="{E68E75D6-761A-40F6-92D7-5D34BDFDED6B}" destId="{6F1B3249-C222-4DDB-A636-3200F8B317BC}" srcOrd="0" destOrd="0" presId="urn:microsoft.com/office/officeart/2009/3/layout/SubStepProcess"/>
     <dgm:cxn modelId="{644B7DC9-0862-46B5-B9A1-663198E1ECFA}" type="presOf" srcId="{F0E93695-53B8-4FC4-A086-1D1368A1D979}" destId="{665F2682-A452-430A-A3D8-81BEFE3D16A5}" srcOrd="0" destOrd="0" presId="urn:microsoft.com/office/officeart/2009/3/layout/SubStepProcess"/>
-    <dgm:cxn modelId="{54F418C8-B003-4C3E-9127-5F1AB7C5EAB9}" type="presOf" srcId="{6A3553B0-7A40-4A90-8516-16E3CA923718}" destId="{5C20E412-C74A-48DA-A2A0-6CC529AF4FA3}" srcOrd="0" destOrd="0" presId="urn:microsoft.com/office/officeart/2009/3/layout/SubStepProcess"/>
+    <dgm:cxn modelId="{F6ABFB68-ED34-4CE6-808C-BE75A6866E02}" srcId="{95BAF3F2-D109-4E98-938E-0D603B5A9F7E}" destId="{5F3E792C-E8E1-476D-A80F-9499729EB818}" srcOrd="1" destOrd="0" parTransId="{86EDC1AE-450F-413C-BFB9-337801F67ECB}" sibTransId="{7911D3D9-7603-4E23-8D5B-51615984B9C4}"/>
+    <dgm:cxn modelId="{BB55E895-5854-49E5-B68B-590ADBCE66FD}" srcId="{AD95B609-3303-4583-87CD-2E7F35A6232A}" destId="{33060EEB-721D-46E8-A715-2FC01D6BD15A}" srcOrd="5" destOrd="0" parTransId="{96364B11-B350-41FB-8E2B-B34E47C1D94A}" sibTransId="{9722F965-D8DA-42EF-92C5-FE9E51E31C1D}"/>
+    <dgm:cxn modelId="{8E97018E-B7DF-4E20-8722-CCCA4B5E1266}" type="presOf" srcId="{9C8E4A14-3A8E-458D-8E2C-9E6CF1CCC4B0}" destId="{64ECA41F-8C16-4299-9A9C-307AD1C48C43}" srcOrd="0" destOrd="0" presId="urn:microsoft.com/office/officeart/2009/3/layout/SubStepProcess"/>
+    <dgm:cxn modelId="{F658C6DC-E3B9-4DF8-8CB6-5AFB4FE20A71}" type="presOf" srcId="{8A2B1C81-E47D-47F9-AF76-7772C9C66239}" destId="{69457D61-8171-4A3D-B02E-77898F9E34F4}" srcOrd="0" destOrd="0" presId="urn:microsoft.com/office/officeart/2009/3/layout/SubStepProcess"/>
+    <dgm:cxn modelId="{80D65BB7-863C-43A0-B16C-EE8308742636}" type="presOf" srcId="{C0E686F4-07E0-48F0-9175-5A4E8D81D8F8}" destId="{389E0D84-76EC-4FFF-A4B8-7C47016BC1F8}" srcOrd="0" destOrd="0" presId="urn:microsoft.com/office/officeart/2009/3/layout/SubStepProcess"/>
+    <dgm:cxn modelId="{377FACA8-B085-47AC-B304-A0E88863179D}" type="presOf" srcId="{89511B21-2A9E-472A-9A95-A6CC8E5FAADC}" destId="{CD82906B-C356-4E42-B320-83690748577F}" srcOrd="0" destOrd="0" presId="urn:microsoft.com/office/officeart/2009/3/layout/SubStepProcess"/>
+    <dgm:cxn modelId="{DAA1C1C8-0688-4806-8A68-F6112A67A090}" srcId="{5F3E792C-E8E1-476D-A80F-9499729EB818}" destId="{819C193B-EAAC-476D-87A2-67263294D4D7}" srcOrd="1" destOrd="0" parTransId="{8399B9EE-C7E2-4231-A7C8-EA226A9367CB}" sibTransId="{79E766F7-3576-4828-BC83-6F97132DFE01}"/>
+    <dgm:cxn modelId="{D3AF6C03-A3CB-480F-97B6-3EE9EAD07334}" type="presOf" srcId="{AD95B609-3303-4583-87CD-2E7F35A6232A}" destId="{ECA4621E-2E99-4BEF-9592-8A07D21B3E61}" srcOrd="0" destOrd="0" presId="urn:microsoft.com/office/officeart/2009/3/layout/SubStepProcess"/>
+    <dgm:cxn modelId="{8140EE19-556D-4E7E-A353-1E233B3F5AC0}" type="presOf" srcId="{EDD1FF38-46FD-4A03-BCBE-20400FF7D1C8}" destId="{5D0F8DBC-FA8A-4ACB-A014-076E69604080}" srcOrd="0" destOrd="0" presId="urn:microsoft.com/office/officeart/2009/3/layout/SubStepProcess"/>
+    <dgm:cxn modelId="{5BD6DBEF-E391-4FA4-B6E3-2F80ED0491B5}" type="presOf" srcId="{09EA8485-884F-484C-A626-8D7CC15A3984}" destId="{CA782425-D4E6-4F03-9D7E-94A648C70890}" srcOrd="0" destOrd="0" presId="urn:microsoft.com/office/officeart/2009/3/layout/SubStepProcess"/>
+    <dgm:cxn modelId="{34BEB09E-E2A5-4DF6-B8E2-B6D70FF4B1CF}" type="presOf" srcId="{C9FBCAE5-829B-4790-8E80-1EECA1A01A54}" destId="{B69F6CCC-94E3-460A-9C6F-EB373D226EE5}" srcOrd="0" destOrd="0" presId="urn:microsoft.com/office/officeart/2009/3/layout/SubStepProcess"/>
+    <dgm:cxn modelId="{434BDFE1-C15D-40CC-A54F-F9725EADEFA2}" type="presOf" srcId="{33060EEB-721D-46E8-A715-2FC01D6BD15A}" destId="{875414DA-731F-42C8-985C-69C9D4D037D6}" srcOrd="0" destOrd="0" presId="urn:microsoft.com/office/officeart/2009/3/layout/SubStepProcess"/>
+    <dgm:cxn modelId="{B0F2EEBF-33AE-4D0F-B65C-C95F8D10DAFB}" srcId="{AD95B609-3303-4583-87CD-2E7F35A6232A}" destId="{EDD1FF38-46FD-4A03-BCBE-20400FF7D1C8}" srcOrd="1" destOrd="0" parTransId="{25DBED34-3B55-46C2-92B0-F73CB140844A}" sibTransId="{1BC48B71-3693-4D66-8B80-472DE094EEBB}"/>
     <dgm:cxn modelId="{4B5413BA-4CBE-4FE6-B24D-47F97A25911D}" type="presOf" srcId="{923AF866-B32B-4260-B12C-2D9D1E7F500A}" destId="{BBD82359-4377-47EB-9B8B-CAD76182BA0B}" srcOrd="0" destOrd="0" presId="urn:microsoft.com/office/officeart/2009/3/layout/SubStepProcess"/>
-    <dgm:cxn modelId="{FFAB0640-BE7B-46C0-8665-26BD249B3807}" srcId="{95BAF3F2-D109-4E98-938E-0D603B5A9F7E}" destId="{C8DEEE97-A2B3-4862-9DF2-3CEFFDAFBD8C}" srcOrd="2" destOrd="0" parTransId="{C7B2C226-A6D5-4834-8096-D1248E9CC62E}" sibTransId="{91CF8BD8-BFB9-40E3-853E-F90C6E8E6A13}"/>
-    <dgm:cxn modelId="{7B289421-D34D-4D74-859B-AC7E21915524}" srcId="{AD95B609-3303-4583-87CD-2E7F35A6232A}" destId="{C10C8E44-53F0-4A95-B9E0-2C9674291AA8}" srcOrd="3" destOrd="0" parTransId="{920BB62B-541D-4CE3-A066-A85B338438D5}" sibTransId="{061A730A-78F6-4A11-99AC-7B30F084080D}"/>
-    <dgm:cxn modelId="{BB55E895-5854-49E5-B68B-590ADBCE66FD}" srcId="{AD95B609-3303-4583-87CD-2E7F35A6232A}" destId="{33060EEB-721D-46E8-A715-2FC01D6BD15A}" srcOrd="5" destOrd="0" parTransId="{96364B11-B350-41FB-8E2B-B34E47C1D94A}" sibTransId="{9722F965-D8DA-42EF-92C5-FE9E51E31C1D}"/>
+    <dgm:cxn modelId="{92127220-0A13-466E-AB84-2717FD98E1F4}" type="presOf" srcId="{6DB29109-100D-48FC-AE54-B7783E34D7A7}" destId="{D8A00F33-4D08-48BD-A1DF-39F3BE097E6F}" srcOrd="0" destOrd="0" presId="urn:microsoft.com/office/officeart/2009/3/layout/SubStepProcess"/>
+    <dgm:cxn modelId="{198D3979-2267-4660-8977-14D75A3B4E78}" srcId="{5F3E792C-E8E1-476D-A80F-9499729EB818}" destId="{9C8E4A14-3A8E-458D-8E2C-9E6CF1CCC4B0}" srcOrd="6" destOrd="0" parTransId="{A04CC4F2-75DE-4F68-A745-417004977698}" sibTransId="{C848A657-410B-47FE-97E4-32DE211692A4}"/>
+    <dgm:cxn modelId="{5F736D82-879F-4B3C-913F-3051C7E05534}" type="presOf" srcId="{FB911FC4-0553-4EE8-B15D-6BC139993559}" destId="{F80CB992-25F3-4146-990C-CB3F855D4E45}" srcOrd="0" destOrd="0" presId="urn:microsoft.com/office/officeart/2009/3/layout/SubStepProcess"/>
+    <dgm:cxn modelId="{068E6F1E-736A-46C5-B02A-C306EA3B88EC}" srcId="{AD95B609-3303-4583-87CD-2E7F35A6232A}" destId="{C0E686F4-07E0-48F0-9175-5A4E8D81D8F8}" srcOrd="2" destOrd="0" parTransId="{AB56B838-13C1-4272-A57B-C7EBE9D83F0E}" sibTransId="{C2B9156C-1718-44F9-961C-87D932C09337}"/>
     <dgm:cxn modelId="{07AD1FD7-1774-4689-A54F-41ADED4D8F53}" srcId="{C8DEEE97-A2B3-4862-9DF2-3CEFFDAFBD8C}" destId="{6DB29109-100D-48FC-AE54-B7783E34D7A7}" srcOrd="1" destOrd="0" parTransId="{02A31342-2519-42A2-8333-40D4384B27EF}" sibTransId="{8FB1B6A8-2918-4F6C-9C38-6CECD4EE07B7}"/>
-    <dgm:cxn modelId="{25B05C16-2E1D-4598-A63C-2EBA88E4E99E}" srcId="{AD95B609-3303-4583-87CD-2E7F35A6232A}" destId="{C9FBCAE5-829B-4790-8E80-1EECA1A01A54}" srcOrd="7" destOrd="0" parTransId="{7A836164-CEBD-48A7-AC9C-F5DD82973333}" sibTransId="{EE61A56A-8119-4850-BEBC-D362BADC6A72}"/>
-    <dgm:cxn modelId="{3F9DF11D-9E55-40DB-828E-94E39C910C39}" srcId="{95BAF3F2-D109-4E98-938E-0D603B5A9F7E}" destId="{AD95B609-3303-4583-87CD-2E7F35A6232A}" srcOrd="0" destOrd="0" parTransId="{CA20A938-4752-4205-AB97-93C91C21D438}" sibTransId="{3B9797B8-1C0C-4F3D-B18B-50FEFFD6A0E1}"/>
-    <dgm:cxn modelId="{E840FF57-B382-423C-81EB-BAE38A169A99}" type="presOf" srcId="{819C193B-EAAC-476D-87A2-67263294D4D7}" destId="{F584A7AF-7AC4-466A-8058-C318E2452A4B}" srcOrd="0" destOrd="0" presId="urn:microsoft.com/office/officeart/2009/3/layout/SubStepProcess"/>
-    <dgm:cxn modelId="{F658C6DC-E3B9-4DF8-8CB6-5AFB4FE20A71}" type="presOf" srcId="{8A2B1C81-E47D-47F9-AF76-7772C9C66239}" destId="{69457D61-8171-4A3D-B02E-77898F9E34F4}" srcOrd="0" destOrd="0" presId="urn:microsoft.com/office/officeart/2009/3/layout/SubStepProcess"/>
-    <dgm:cxn modelId="{F6ABFB68-ED34-4CE6-808C-BE75A6866E02}" srcId="{95BAF3F2-D109-4E98-938E-0D603B5A9F7E}" destId="{5F3E792C-E8E1-476D-A80F-9499729EB818}" srcOrd="1" destOrd="0" parTransId="{86EDC1AE-450F-413C-BFB9-337801F67ECB}" sibTransId="{7911D3D9-7603-4E23-8D5B-51615984B9C4}"/>
-    <dgm:cxn modelId="{0844B31D-EA76-413B-90AD-5BC0795A08EC}" type="presOf" srcId="{95BAF3F2-D109-4E98-938E-0D603B5A9F7E}" destId="{4144592D-B1E6-44E0-B992-396491D46FD6}" srcOrd="0" destOrd="0" presId="urn:microsoft.com/office/officeart/2009/3/layout/SubStepProcess"/>
-    <dgm:cxn modelId="{F48F5137-40DB-4A59-99E3-0E978E3DEF58}" srcId="{AD95B609-3303-4583-87CD-2E7F35A6232A}" destId="{923AF866-B32B-4260-B12C-2D9D1E7F500A}" srcOrd="6" destOrd="0" parTransId="{AF943EA0-1A4F-46EE-A05F-E3454E545030}" sibTransId="{A687BB37-1EE6-4B22-8B58-BC618FF5F169}"/>
-    <dgm:cxn modelId="{851DB145-7372-4AC1-AF6A-D698EF9EE1BC}" srcId="{AD95B609-3303-4583-87CD-2E7F35A6232A}" destId="{09EA8485-884F-484C-A626-8D7CC15A3984}" srcOrd="0" destOrd="0" parTransId="{5FB69482-A19E-4427-96EA-07A3C9999C37}" sibTransId="{8AAC2FF5-D3FB-432C-861F-AB07B94A8D17}"/>
-    <dgm:cxn modelId="{2272C4A2-DBEA-444D-A06E-3431E02455D7}" type="presOf" srcId="{5F3E792C-E8E1-476D-A80F-9499729EB818}" destId="{930BC43C-89CA-4487-8A31-9FD4482A7DBB}" srcOrd="0" destOrd="0" presId="urn:microsoft.com/office/officeart/2009/3/layout/SubStepProcess"/>
-    <dgm:cxn modelId="{92127220-0A13-466E-AB84-2717FD98E1F4}" type="presOf" srcId="{6DB29109-100D-48FC-AE54-B7783E34D7A7}" destId="{D8A00F33-4D08-48BD-A1DF-39F3BE097E6F}" srcOrd="0" destOrd="0" presId="urn:microsoft.com/office/officeart/2009/3/layout/SubStepProcess"/>
-    <dgm:cxn modelId="{B0F2EEBF-33AE-4D0F-B65C-C95F8D10DAFB}" srcId="{AD95B609-3303-4583-87CD-2E7F35A6232A}" destId="{EDD1FF38-46FD-4A03-BCBE-20400FF7D1C8}" srcOrd="1" destOrd="0" parTransId="{25DBED34-3B55-46C2-92B0-F73CB140844A}" sibTransId="{1BC48B71-3693-4D66-8B80-472DE094EEBB}"/>
-    <dgm:cxn modelId="{8B1CD69F-17F8-408D-9317-3FFF303D955D}" srcId="{5F3E792C-E8E1-476D-A80F-9499729EB818}" destId="{F0E93695-53B8-4FC4-A086-1D1368A1D979}" srcOrd="5" destOrd="0" parTransId="{CECFB84A-5A6F-4AF8-A5F1-6D04D4FFEA8C}" sibTransId="{748B5E76-AAE3-42CC-A068-BA09A8FF52F7}"/>
     <dgm:cxn modelId="{B8A6BEF9-DFA4-4199-AA3E-3812787480C3}" type="presParOf" srcId="{4144592D-B1E6-44E0-B992-396491D46FD6}" destId="{ECA4621E-2E99-4BEF-9592-8A07D21B3E61}" srcOrd="0" destOrd="0" presId="urn:microsoft.com/office/officeart/2009/3/layout/SubStepProcess"/>
     <dgm:cxn modelId="{5C9A286A-D6FF-44D6-9281-8B83257C0103}" type="presParOf" srcId="{4144592D-B1E6-44E0-B992-396491D46FD6}" destId="{2A563650-F912-4157-A811-C159B047D303}" srcOrd="1" destOrd="0" presId="urn:microsoft.com/office/officeart/2009/3/layout/SubStepProcess"/>
     <dgm:cxn modelId="{D04A4040-82E1-4D7A-8357-21DD84823907}" type="presParOf" srcId="{4144592D-B1E6-44E0-B992-396491D46FD6}" destId="{5CFD5AEE-B526-4A28-9A9F-CD5A5B54978C}" srcOrd="2" destOrd="0" presId="urn:microsoft.com/office/officeart/2009/3/layout/SubStepProcess"/>
@@ -25225,7 +25225,7 @@
           <a:p>
             <a:fld id="{D383A388-81AD-4DD0-BB49-0C836E9CC166}" type="datetimeFigureOut">
               <a:rPr lang="en-US" smtClean="0"/>
-              <a:t>5/16/14</a:t>
+              <a:t>5/20/14</a:t>
             </a:fld>
             <a:endParaRPr lang="en-US"/>
           </a:p>
@@ -25391,7 +25391,7 @@
           <a:p>
             <a:fld id="{83A42379-093C-4640-BDB0-A25E629AF4AF}" type="datetimeFigureOut">
               <a:rPr lang="en-US" smtClean="0"/>
-              <a:t>5/16/14</a:t>
+              <a:t>5/20/14</a:t>
             </a:fld>
             <a:endParaRPr lang="en-US"/>
           </a:p>
@@ -25893,6 +25893,104 @@
           <a:lstStyle/>
           <a:p>
             <a:r>
+              <a:rPr lang="en-US" dirty="0" err="1" smtClean="0"/>
+              <a:t>AppDelegate</a:t>
+            </a:r>
+            <a:r>
+              <a:rPr lang="en-US" baseline="0" dirty="0" smtClean="0"/>
+              <a:t> must be registered</a:t>
+            </a:r>
+          </a:p>
+          <a:p>
+            <a:r>
+              <a:rPr lang="en-US" baseline="0" dirty="0" smtClean="0"/>
+              <a:t>Main needs to be labeled as an Entry Point. </a:t>
+            </a:r>
+          </a:p>
+          <a:p>
+            <a:endParaRPr lang="en-US" dirty="0" smtClean="0"/>
+          </a:p>
+          <a:p>
+            <a:r>
+              <a:rPr lang="en-US" dirty="0" err="1" smtClean="0"/>
+              <a:t>FinishedLaunching</a:t>
+            </a:r>
+            <a:r>
+              <a:rPr lang="en-US" baseline="0" dirty="0" smtClean="0"/>
+              <a:t>: </a:t>
+            </a:r>
+          </a:p>
+          <a:p>
+            <a:pPr marL="171450" indent="-171450">
+              <a:buFontTx/>
+              <a:buChar char="-"/>
+            </a:pPr>
+            <a:r>
+              <a:rPr lang="en-US" baseline="0" dirty="0" smtClean="0"/>
+              <a:t>Set root view controller. </a:t>
+            </a:r>
+            <a:endParaRPr lang="en-US" dirty="0"/>
+          </a:p>
+        </p:txBody>
+      </p:sp>
+    </p:spTree>
+    <p:extLst>
+      <p:ext uri="{BB962C8B-B14F-4D97-AF65-F5344CB8AC3E}">
+        <p14:creationId xmlns:p14="http://schemas.microsoft.com/office/powerpoint/2010/main" val="1518105697"/>
+      </p:ext>
+    </p:extLst>
+  </p:cSld>
+  <p:clrMapOvr>
+    <a:masterClrMapping/>
+  </p:clrMapOvr>
+</p:notes>
+</file>
+
+<file path=ppt/notesSlides/notesSlide11.xml><?xml version="1.0" encoding="utf-8"?>
+<p:notes xmlns:a="http://schemas.openxmlformats.org/drawingml/2006/main" xmlns:r="http://schemas.openxmlformats.org/officeDocument/2006/relationships" xmlns:p="http://schemas.openxmlformats.org/presentationml/2006/main">
+  <p:cSld>
+    <p:spTree>
+      <p:nvGrpSpPr>
+        <p:cNvPr id="1" name=""/>
+        <p:cNvGrpSpPr/>
+        <p:nvPr/>
+      </p:nvGrpSpPr>
+      <p:grpSpPr>
+        <a:xfrm>
+          <a:off x="0" y="0"/>
+          <a:ext cx="0" cy="0"/>
+          <a:chOff x="0" y="0"/>
+          <a:chExt cx="0" cy="0"/>
+        </a:xfrm>
+      </p:grpSpPr>
+      <p:sp>
+        <p:nvSpPr>
+          <p:cNvPr id="2" name="Slide Image Placeholder 1"/>
+          <p:cNvSpPr>
+            <a:spLocks noGrp="1" noRot="1" noChangeAspect="1"/>
+          </p:cNvSpPr>
+          <p:nvPr>
+            <p:ph type="sldImg"/>
+          </p:nvPr>
+        </p:nvSpPr>
+        <p:spPr/>
+      </p:sp>
+      <p:sp>
+        <p:nvSpPr>
+          <p:cNvPr id="3" name="Notes Placeholder 2"/>
+          <p:cNvSpPr>
+            <a:spLocks noGrp="1"/>
+          </p:cNvSpPr>
+          <p:nvPr>
+            <p:ph type="body" idx="1"/>
+          </p:nvPr>
+        </p:nvSpPr>
+        <p:spPr/>
+        <p:txBody>
+          <a:bodyPr/>
+          <a:lstStyle/>
+          <a:p>
+            <a:r>
               <a:rPr lang="en-US" dirty="0" smtClean="0"/>
               <a:t>Register each view controller.</a:t>
             </a:r>
@@ -25950,7 +26048,7 @@
 </p:notes>
 </file>
 
-<file path=ppt/notesSlides/notesSlide11.xml><?xml version="1.0" encoding="utf-8"?>
+<file path=ppt/notesSlides/notesSlide12.xml><?xml version="1.0" encoding="utf-8"?>
 <p:notes xmlns:a="http://schemas.openxmlformats.org/drawingml/2006/main" xmlns:r="http://schemas.openxmlformats.org/officeDocument/2006/relationships" xmlns:p="http://schemas.openxmlformats.org/presentationml/2006/main">
   <p:cSld>
     <p:spTree>
@@ -26118,6 +26216,75 @@
           <a:p>
             <a:r>
               <a:rPr lang="en-US" dirty="0" smtClean="0"/>
+              <a:t>Clarity &amp; conciseness</a:t>
+            </a:r>
+            <a:r>
+              <a:rPr lang="en-US" baseline="0" dirty="0" smtClean="0"/>
+              <a:t> of code. </a:t>
+            </a:r>
+            <a:endParaRPr lang="en-US" dirty="0"/>
+          </a:p>
+        </p:txBody>
+      </p:sp>
+    </p:spTree>
+    <p:extLst>
+      <p:ext uri="{BB962C8B-B14F-4D97-AF65-F5344CB8AC3E}">
+        <p14:creationId xmlns:p14="http://schemas.microsoft.com/office/powerpoint/2010/main" val="711773857"/>
+      </p:ext>
+    </p:extLst>
+  </p:cSld>
+  <p:clrMapOvr>
+    <a:masterClrMapping/>
+  </p:clrMapOvr>
+</p:notes>
+</file>
+
+<file path=ppt/notesSlides/notesSlide4.xml><?xml version="1.0" encoding="utf-8"?>
+<p:notes xmlns:a="http://schemas.openxmlformats.org/drawingml/2006/main" xmlns:r="http://schemas.openxmlformats.org/officeDocument/2006/relationships" xmlns:p="http://schemas.openxmlformats.org/presentationml/2006/main">
+  <p:cSld>
+    <p:spTree>
+      <p:nvGrpSpPr>
+        <p:cNvPr id="1" name=""/>
+        <p:cNvGrpSpPr/>
+        <p:nvPr/>
+      </p:nvGrpSpPr>
+      <p:grpSpPr>
+        <a:xfrm>
+          <a:off x="0" y="0"/>
+          <a:ext cx="0" cy="0"/>
+          <a:chOff x="0" y="0"/>
+          <a:chExt cx="0" cy="0"/>
+        </a:xfrm>
+      </p:grpSpPr>
+      <p:sp>
+        <p:nvSpPr>
+          <p:cNvPr id="2" name="Slide Image Placeholder 1"/>
+          <p:cNvSpPr>
+            <a:spLocks noGrp="1" noRot="1" noChangeAspect="1"/>
+          </p:cNvSpPr>
+          <p:nvPr>
+            <p:ph type="sldImg"/>
+          </p:nvPr>
+        </p:nvSpPr>
+        <p:spPr/>
+      </p:sp>
+      <p:sp>
+        <p:nvSpPr>
+          <p:cNvPr id="3" name="Notes Placeholder 2"/>
+          <p:cNvSpPr>
+            <a:spLocks noGrp="1"/>
+          </p:cNvSpPr>
+          <p:nvPr>
+            <p:ph type="body" idx="1"/>
+          </p:nvPr>
+        </p:nvSpPr>
+        <p:spPr/>
+        <p:txBody>
+          <a:bodyPr/>
+          <a:lstStyle/>
+          <a:p>
+            <a:r>
+              <a:rPr lang="en-US" dirty="0" smtClean="0"/>
               <a:t>F#</a:t>
             </a:r>
             <a:r>
@@ -26141,7 +26308,7 @@
 </p:notes>
 </file>
 
-<file path=ppt/notesSlides/notesSlide4.xml><?xml version="1.0" encoding="utf-8"?>
+<file path=ppt/notesSlides/notesSlide5.xml><?xml version="1.0" encoding="utf-8"?>
 <p:notes xmlns:a="http://schemas.openxmlformats.org/drawingml/2006/main" xmlns:r="http://schemas.openxmlformats.org/officeDocument/2006/relationships" xmlns:p="http://schemas.openxmlformats.org/presentationml/2006/main">
   <p:cSld>
     <p:spTree>
@@ -26202,7 +26369,7 @@
 </p:notes>
 </file>
 
-<file path=ppt/notesSlides/notesSlide5.xml><?xml version="1.0" encoding="utf-8"?>
+<file path=ppt/notesSlides/notesSlide6.xml><?xml version="1.0" encoding="utf-8"?>
 <p:notes xmlns:a="http://schemas.openxmlformats.org/drawingml/2006/main" xmlns:r="http://schemas.openxmlformats.org/officeDocument/2006/relationships" xmlns:p="http://schemas.openxmlformats.org/presentationml/2006/main">
   <p:cSld>
     <p:spTree>
@@ -26247,9 +26414,18 @@
           <a:lstStyle/>
           <a:p>
             <a:r>
-              <a:rPr lang="en-US" dirty="0" smtClean="0"/>
-              <a:t>Option types! </a:t>
+              <a:rPr lang="en-US" dirty="0" err="1" smtClean="0"/>
+              <a:t>NullReferenceException</a:t>
             </a:r>
+            <a:r>
+              <a:rPr lang="en-US" baseline="0" dirty="0" smtClean="0"/>
+              <a:t> can be obviated because of </a:t>
+            </a:r>
+            <a:r>
+              <a:rPr lang="en-US" baseline="0" smtClean="0"/>
+              <a:t>option types. </a:t>
+            </a:r>
+            <a:endParaRPr lang="en-US" dirty="0" smtClean="0"/>
           </a:p>
           <a:p>
             <a:endParaRPr lang="en-US" dirty="0"/>
@@ -26269,7 +26445,7 @@
 </p:notes>
 </file>
 
-<file path=ppt/notesSlides/notesSlide6.xml><?xml version="1.0" encoding="utf-8"?>
+<file path=ppt/notesSlides/notesSlide7.xml><?xml version="1.0" encoding="utf-8"?>
 <p:notes xmlns:a="http://schemas.openxmlformats.org/drawingml/2006/main" xmlns:r="http://schemas.openxmlformats.org/officeDocument/2006/relationships" xmlns:p="http://schemas.openxmlformats.org/presentationml/2006/main">
   <p:cSld>
     <p:spTree>
@@ -26362,7 +26538,7 @@
 </p:notes>
 </file>
 
-<file path=ppt/notesSlides/notesSlide7.xml><?xml version="1.0" encoding="utf-8"?>
+<file path=ppt/notesSlides/notesSlide8.xml><?xml version="1.0" encoding="utf-8"?>
 <p:notes xmlns:a="http://schemas.openxmlformats.org/drawingml/2006/main" xmlns:r="http://schemas.openxmlformats.org/officeDocument/2006/relationships" xmlns:p="http://schemas.openxmlformats.org/presentationml/2006/main">
   <p:cSld>
     <p:spTree>
@@ -26423,7 +26599,7 @@
 </p:notes>
 </file>
 
-<file path=ppt/notesSlides/notesSlide8.xml><?xml version="1.0" encoding="utf-8"?>
+<file path=ppt/notesSlides/notesSlide9.xml><?xml version="1.0" encoding="utf-8"?>
 <p:notes xmlns:a="http://schemas.openxmlformats.org/drawingml/2006/main" xmlns:r="http://schemas.openxmlformats.org/officeDocument/2006/relationships" xmlns:p="http://schemas.openxmlformats.org/presentationml/2006/main">
   <p:cSld>
     <p:spTree>
@@ -26535,104 +26711,6 @@
     <p:extLst>
       <p:ext uri="{BB962C8B-B14F-4D97-AF65-F5344CB8AC3E}">
         <p14:creationId xmlns:p14="http://schemas.microsoft.com/office/powerpoint/2010/main" val="2047796930"/>
-      </p:ext>
-    </p:extLst>
-  </p:cSld>
-  <p:clrMapOvr>
-    <a:masterClrMapping/>
-  </p:clrMapOvr>
-</p:notes>
-</file>
-
-<file path=ppt/notesSlides/notesSlide9.xml><?xml version="1.0" encoding="utf-8"?>
-<p:notes xmlns:a="http://schemas.openxmlformats.org/drawingml/2006/main" xmlns:r="http://schemas.openxmlformats.org/officeDocument/2006/relationships" xmlns:p="http://schemas.openxmlformats.org/presentationml/2006/main">
-  <p:cSld>
-    <p:spTree>
-      <p:nvGrpSpPr>
-        <p:cNvPr id="1" name=""/>
-        <p:cNvGrpSpPr/>
-        <p:nvPr/>
-      </p:nvGrpSpPr>
-      <p:grpSpPr>
-        <a:xfrm>
-          <a:off x="0" y="0"/>
-          <a:ext cx="0" cy="0"/>
-          <a:chOff x="0" y="0"/>
-          <a:chExt cx="0" cy="0"/>
-        </a:xfrm>
-      </p:grpSpPr>
-      <p:sp>
-        <p:nvSpPr>
-          <p:cNvPr id="2" name="Slide Image Placeholder 1"/>
-          <p:cNvSpPr>
-            <a:spLocks noGrp="1" noRot="1" noChangeAspect="1"/>
-          </p:cNvSpPr>
-          <p:nvPr>
-            <p:ph type="sldImg"/>
-          </p:nvPr>
-        </p:nvSpPr>
-        <p:spPr/>
-      </p:sp>
-      <p:sp>
-        <p:nvSpPr>
-          <p:cNvPr id="3" name="Notes Placeholder 2"/>
-          <p:cNvSpPr>
-            <a:spLocks noGrp="1"/>
-          </p:cNvSpPr>
-          <p:nvPr>
-            <p:ph type="body" idx="1"/>
-          </p:nvPr>
-        </p:nvSpPr>
-        <p:spPr/>
-        <p:txBody>
-          <a:bodyPr/>
-          <a:lstStyle/>
-          <a:p>
-            <a:r>
-              <a:rPr lang="en-US" dirty="0" err="1" smtClean="0"/>
-              <a:t>AppDelegate</a:t>
-            </a:r>
-            <a:r>
-              <a:rPr lang="en-US" baseline="0" dirty="0" smtClean="0"/>
-              <a:t> must be registered</a:t>
-            </a:r>
-          </a:p>
-          <a:p>
-            <a:r>
-              <a:rPr lang="en-US" baseline="0" dirty="0" smtClean="0"/>
-              <a:t>Main needs to be labeled as an Entry Point. </a:t>
-            </a:r>
-          </a:p>
-          <a:p>
-            <a:endParaRPr lang="en-US" dirty="0" smtClean="0"/>
-          </a:p>
-          <a:p>
-            <a:r>
-              <a:rPr lang="en-US" dirty="0" err="1" smtClean="0"/>
-              <a:t>FinishedLaunching</a:t>
-            </a:r>
-            <a:r>
-              <a:rPr lang="en-US" baseline="0" dirty="0" smtClean="0"/>
-              <a:t>: </a:t>
-            </a:r>
-          </a:p>
-          <a:p>
-            <a:pPr marL="171450" indent="-171450">
-              <a:buFontTx/>
-              <a:buChar char="-"/>
-            </a:pPr>
-            <a:r>
-              <a:rPr lang="en-US" baseline="0" dirty="0" smtClean="0"/>
-              <a:t>Set root view controller. </a:t>
-            </a:r>
-            <a:endParaRPr lang="en-US" dirty="0"/>
-          </a:p>
-        </p:txBody>
-      </p:sp>
-    </p:spTree>
-    <p:extLst>
-      <p:ext uri="{BB962C8B-B14F-4D97-AF65-F5344CB8AC3E}">
-        <p14:creationId xmlns:p14="http://schemas.microsoft.com/office/powerpoint/2010/main" val="1518105697"/>
       </p:ext>
     </p:extLst>
   </p:cSld>
@@ -26919,7 +26997,7 @@
             <a:pPr eaLnBrk="1" latinLnBrk="0" hangingPunct="1"/>
             <a:fld id="{81663A10-8963-408B-B7A7-2BE0C9C01E2A}" type="datetime1">
               <a:rPr lang="en-US" smtClean="0"/>
-              <a:t>5/16/14</a:t>
+              <a:t>5/20/14</a:t>
             </a:fld>
             <a:endParaRPr lang="en-US"/>
           </a:p>
@@ -27291,7 +27369,7 @@
   </p:clrMapOvr>
   <p:extLst mod="1">
     <p:ext uri="{DCECCB84-F9BA-43D5-87BE-67443E8EF086}">
-      <p15:sldGuideLst xmlns="" xmlns:p15="http://schemas.microsoft.com/office/powerpoint/2012/main">
+      <p15:sldGuideLst xmlns:p15="http://schemas.microsoft.com/office/powerpoint/2012/main" xmlns="">
         <p15:guide id="1" orient="horz" pos="2160">
           <p15:clr>
             <a:srgbClr val="FBAE40"/>
@@ -27920,7 +27998,7 @@
             <a:pPr eaLnBrk="1" latinLnBrk="0" hangingPunct="1"/>
             <a:fld id="{F2890721-CDC0-49BE-AFE7-64C944AACF5F}" type="datetime1">
               <a:rPr lang="en-US" smtClean="0"/>
-              <a:t>5/16/14</a:t>
+              <a:t>5/20/14</a:t>
             </a:fld>
             <a:endParaRPr lang="en-US" dirty="0"/>
           </a:p>
@@ -28053,7 +28131,7 @@
             <a:pPr eaLnBrk="1" latinLnBrk="0" hangingPunct="1"/>
             <a:fld id="{433A5BE9-678F-4DD1-95B6-930E3381EA12}" type="datetime1">
               <a:rPr lang="en-US" smtClean="0"/>
-              <a:t>5/16/14</a:t>
+              <a:t>5/20/14</a:t>
             </a:fld>
             <a:endParaRPr lang="en-US"/>
           </a:p>
@@ -28577,7 +28655,7 @@
             <a:pPr eaLnBrk="1" latinLnBrk="0" hangingPunct="1"/>
             <a:fld id="{02BDF250-BE5F-44C9-A5DF-DC957FDCFC0D}" type="datetime1">
               <a:rPr lang="en-US" smtClean="0"/>
-              <a:t>5/16/14</a:t>
+              <a:t>5/20/14</a:t>
             </a:fld>
             <a:endParaRPr lang="en-US"/>
           </a:p>
@@ -28911,7 +28989,7 @@
             <a:pPr eaLnBrk="1" latinLnBrk="0" hangingPunct="1"/>
             <a:fld id="{9CE94D95-E352-415A-8F95-D0C060D20FB1}" type="datetime1">
               <a:rPr lang="en-US" smtClean="0"/>
-              <a:t>5/16/14</a:t>
+              <a:t>5/20/14</a:t>
             </a:fld>
             <a:endParaRPr lang="en-US"/>
           </a:p>
@@ -29192,7 +29270,7 @@
   </p:clrMapOvr>
   <p:extLst mod="1">
     <p:ext uri="{DCECCB84-F9BA-43D5-87BE-67443E8EF086}">
-      <p15:sldGuideLst xmlns="" xmlns:p15="http://schemas.microsoft.com/office/powerpoint/2012/main">
+      <p15:sldGuideLst xmlns:p15="http://schemas.microsoft.com/office/powerpoint/2012/main" xmlns="">
         <p15:guide id="2" orient="horz" pos="2160">
           <p15:clr>
             <a:srgbClr val="FBAE40"/>
@@ -29273,7 +29351,7 @@
             <a:pPr eaLnBrk="1" latinLnBrk="0" hangingPunct="1"/>
             <a:fld id="{958722A3-5E87-44C8-AE92-65C6CEBEF68D}" type="datetime1">
               <a:rPr lang="en-US" smtClean="0"/>
-              <a:t>5/16/14</a:t>
+              <a:t>5/20/14</a:t>
             </a:fld>
             <a:endParaRPr lang="en-US"/>
           </a:p>
@@ -29799,7 +29877,7 @@
             <a:pPr eaLnBrk="1" latinLnBrk="0" hangingPunct="1"/>
             <a:fld id="{09863461-38BD-4FD1-BF9D-211C72E72FE2}" type="datetime1">
               <a:rPr lang="en-US" smtClean="0"/>
-              <a:t>5/16/14</a:t>
+              <a:t>5/20/14</a:t>
             </a:fld>
             <a:endParaRPr lang="en-US"/>
           </a:p>
@@ -30024,7 +30102,7 @@
   </p:clrMapOvr>
   <p:extLst mod="1">
     <p:ext uri="{DCECCB84-F9BA-43D5-87BE-67443E8EF086}">
-      <p15:sldGuideLst xmlns="" xmlns:p15="http://schemas.microsoft.com/office/powerpoint/2012/main">
+      <p15:sldGuideLst xmlns:p15="http://schemas.microsoft.com/office/powerpoint/2012/main" xmlns="">
         <p15:guide id="1" orient="horz" pos="1272">
           <p15:clr>
             <a:srgbClr val="FBAE40"/>
@@ -30105,7 +30183,7 @@
             <a:pPr eaLnBrk="1" latinLnBrk="0" hangingPunct="1"/>
             <a:fld id="{6CBF5709-960A-49A9-8751-FEF9A5E360AA}" type="datetime1">
               <a:rPr lang="en-US" smtClean="0"/>
-              <a:t>5/16/14</a:t>
+              <a:t>5/20/14</a:t>
             </a:fld>
             <a:endParaRPr lang="en-US"/>
           </a:p>
@@ -30733,7 +30811,7 @@
             <a:pPr eaLnBrk="1" latinLnBrk="0" hangingPunct="1"/>
             <a:fld id="{48C1FD80-18FC-4774-8AAB-366B09B2A217}" type="datetime1">
               <a:rPr lang="en-US" smtClean="0"/>
-              <a:t>5/16/14</a:t>
+              <a:t>5/20/14</a:t>
             </a:fld>
             <a:endParaRPr lang="en-US"/>
           </a:p>
@@ -31132,7 +31210,7 @@
             <a:pPr eaLnBrk="1" latinLnBrk="0" hangingPunct="1"/>
             <a:fld id="{BD372ACB-E49B-443C-90A9-D97449131392}" type="datetime1">
               <a:rPr lang="en-US" smtClean="0"/>
-              <a:t>5/16/14</a:t>
+              <a:t>5/20/14</a:t>
             </a:fld>
             <a:endParaRPr lang="en-US"/>
           </a:p>
@@ -31447,7 +31525,7 @@
             <a:pPr eaLnBrk="1" latinLnBrk="0" hangingPunct="1"/>
             <a:fld id="{6508DA99-E421-4EBE-83B7-7AA044411DE1}" type="datetime1">
               <a:rPr lang="en-US" smtClean="0"/>
-              <a:t>5/16/14</a:t>
+              <a:t>5/20/14</a:t>
             </a:fld>
             <a:endParaRPr lang="en-US"/>
           </a:p>
@@ -32169,7 +32247,7 @@
             <a:pPr eaLnBrk="1" latinLnBrk="0" hangingPunct="1"/>
             <a:fld id="{62F7506B-250E-4C9B-A8AF-00707E40032F}" type="datetime1">
               <a:rPr lang="en-US" smtClean="0"/>
-              <a:t>5/16/14</a:t>
+              <a:t>5/20/14</a:t>
             </a:fld>
             <a:endParaRPr lang="en-US"/>
           </a:p>
@@ -32206,7 +32284,7 @@
   </p:clrMapOvr>
   <p:extLst mod="1">
     <p:ext uri="{DCECCB84-F9BA-43D5-87BE-67443E8EF086}">
-      <p15:sldGuideLst xmlns="" xmlns:p15="http://schemas.microsoft.com/office/powerpoint/2012/main">
+      <p15:sldGuideLst xmlns:p15="http://schemas.microsoft.com/office/powerpoint/2012/main" xmlns="">
         <p15:guide id="1" orient="horz" pos="288">
           <p15:clr>
             <a:srgbClr val="FBAE40"/>
@@ -32454,7 +32532,7 @@
             <a:pPr algn="r" eaLnBrk="1" latinLnBrk="0" hangingPunct="1"/>
             <a:fld id="{45888139-7179-4465-8DDF-46377E1DC30B}" type="datetime1">
               <a:rPr lang="en-US" smtClean="0"/>
-              <a:t>5/16/14</a:t>
+              <a:t>5/20/14</a:t>
             </a:fld>
             <a:endParaRPr lang="en-US" sz="1400" dirty="0">
               <a:solidFill>
@@ -33128,7 +33206,7 @@
   </p:txStyles>
   <p:extLst mod="1">
     <p:ext uri="{27BBF7A9-308A-43DC-89C8-2F10F3537804}">
-      <p15:sldGuideLst xmlns="" xmlns:p15="http://schemas.microsoft.com/office/powerpoint/2012/main">
+      <p15:sldGuideLst xmlns:p15="http://schemas.microsoft.com/office/powerpoint/2012/main" xmlns="">
         <p15:guide id="1" pos="2856">
           <p15:clr>
             <a:srgbClr val="F26B43"/>
@@ -34356,11 +34434,7 @@
           <a:p>
             <a:r>
               <a:rPr lang="en-US" dirty="0" smtClean="0"/>
-              <a:t>Why F</a:t>
-            </a:r>
-            <a:r>
-              <a:rPr lang="en-US" dirty="0" smtClean="0"/>
-              <a:t>#: Concise Code</a:t>
+              <a:t>Why F#: Concise Code</a:t>
             </a:r>
             <a:endParaRPr lang="en-US" dirty="0"/>
           </a:p>
@@ -35743,7 +35817,7 @@
             </a:r>
             <a:r>
               <a:rPr lang="en-US" b="0" dirty="0" smtClean="0">
-                <a:hlinkClick r:id="rId2"/>
+                <a:hlinkClick r:id="rId3"/>
               </a:rPr>
               <a:t>Source</a:t>
             </a:r>
@@ -37502,7 +37576,7 @@
   <a:extraClrSchemeLst/>
   <a:extLst>
     <a:ext uri="{05A4C25C-085E-4340-85A3-A5531E510DB2}">
-      <thm15:themeFamily xmlns="" xmlns:thm15="http://schemas.microsoft.com/office/thememl/2012/main" name="Office Theme" id="{62F939B6-93AF-4DB8-9C6B-D6C7DFDC589F}" vid="{4A3C46E8-61CC-4603-A589-7422A47A8E4A}"/>
+      <thm15:themeFamily xmlns:thm15="http://schemas.microsoft.com/office/thememl/2012/main" xmlns="" name="Office Theme" id="{62F939B6-93AF-4DB8-9C6B-D6C7DFDC589F}" vid="{4A3C46E8-61CC-4603-A589-7422A47A8E4A}"/>
     </a:ext>
   </a:extLst>
 </a:theme>
@@ -37763,7 +37837,7 @@
   <a:extraClrSchemeLst/>
   <a:extLst>
     <a:ext uri="{05A4C25C-085E-4340-85A3-A5531E510DB2}">
-      <thm15:themeFamily xmlns="" xmlns:thm15="http://schemas.microsoft.com/office/thememl/2012/main" name="Office Theme" id="{62F939B6-93AF-4DB8-9C6B-D6C7DFDC589F}" vid="{4A3C46E8-61CC-4603-A589-7422A47A8E4A}"/>
+      <thm15:themeFamily xmlns:thm15="http://schemas.microsoft.com/office/thememl/2012/main" xmlns="" name="Office Theme" id="{62F939B6-93AF-4DB8-9C6B-D6C7DFDC589F}" vid="{4A3C46E8-61CC-4603-A589-7422A47A8E4A}"/>
     </a:ext>
   </a:extLst>
 </a:theme>

</xml_diff>

<commit_message>
Small updates from CodeStock.
</commit_message>
<xml_diff>
--- a/Intro to Xamarin F#/F#-iOS.pptx
+++ b/Intro to Xamarin F#/F#-iOS.pptx
@@ -26397,7 +26397,7 @@
               <a:t>Tasky</a:t>
             </a:r>
             <a:r>
-              <a:rPr lang="en-US" smtClean="0"/>
+              <a:rPr lang="en-US" dirty="0" smtClean="0"/>
               <a:t>. </a:t>
             </a:r>
             <a:endParaRPr lang="en-US" dirty="0"/>
@@ -36424,7 +36424,7 @@
 </file>
 
 <file path=ppt/slides/slide17.xml><?xml version="1.0" encoding="utf-8"?>
-<p:sld xmlns:a="http://schemas.openxmlformats.org/drawingml/2006/main" xmlns:r="http://schemas.openxmlformats.org/officeDocument/2006/relationships" xmlns:p="http://schemas.openxmlformats.org/presentationml/2006/main">
+<p:sld xmlns:a="http://schemas.openxmlformats.org/drawingml/2006/main" xmlns:r="http://schemas.openxmlformats.org/officeDocument/2006/relationships" xmlns:p="http://schemas.openxmlformats.org/presentationml/2006/main" show="0">
   <p:cSld>
     <p:spTree>
       <p:nvGrpSpPr>
@@ -36530,7 +36530,7 @@
 </file>
 
 <file path=ppt/slides/slide18.xml><?xml version="1.0" encoding="utf-8"?>
-<p:sld xmlns:a="http://schemas.openxmlformats.org/drawingml/2006/main" xmlns:r="http://schemas.openxmlformats.org/officeDocument/2006/relationships" xmlns:p="http://schemas.openxmlformats.org/presentationml/2006/main">
+<p:sld xmlns:a="http://schemas.openxmlformats.org/drawingml/2006/main" xmlns:r="http://schemas.openxmlformats.org/officeDocument/2006/relationships" xmlns:p="http://schemas.openxmlformats.org/presentationml/2006/main" show="0">
   <p:cSld>
     <p:spTree>
       <p:nvGrpSpPr>
@@ -36668,8 +36668,12 @@
           <a:lstStyle/>
           <a:p>
             <a:r>
+              <a:rPr lang="en-US" dirty="0" err="1" smtClean="0"/>
+              <a:t>Tasky</a:t>
+            </a:r>
+            <a:r>
               <a:rPr lang="en-US" dirty="0" smtClean="0"/>
-              <a:t>Minesweeper</a:t>
+              <a:t> &amp; Minesweeper</a:t>
             </a:r>
             <a:endParaRPr lang="en-US" dirty="0"/>
           </a:p>

</xml_diff>